<commit_message>
in class changes to slides
</commit_message>
<xml_diff>
--- a/assets/ppt/codegen/ssaform3.pptx
+++ b/assets/ppt/codegen/ssaform3.pptx
@@ -5237,19 +5237,7 @@
                 <a:cs typeface="Calibri"/>
                 <a:sym typeface="Calibri"/>
               </a:rPr>
-              <a:t>SSA Form </a:t>
-            </a:r>
-            <a:r>
-              <a:rPr lang="en-US" sz="2400" dirty="0" smtClean="0">
-                <a:solidFill>
-                  <a:schemeClr val="dk1"/>
-                </a:solidFill>
-                <a:latin typeface="Calibri"/>
-                <a:ea typeface="Calibri"/>
-                <a:cs typeface="Calibri"/>
-                <a:sym typeface="Calibri"/>
-              </a:rPr>
-              <a:t>3</a:t>
+              <a:t>SSA Form 3</a:t>
             </a:r>
             <a:endParaRPr lang="en-US" sz="2400" dirty="0">
               <a:solidFill>
@@ -16930,7 +16918,19 @@
             </a:r>
             <a:r>
               <a:rPr lang="en-US" dirty="0" smtClean="0"/>
-              <a:t> if k2 &lt; 100</a:t>
+              <a:t> </a:t>
+            </a:r>
+            <a:r>
+              <a:rPr lang="en-US" smtClean="0"/>
+              <a:t>if </a:t>
+            </a:r>
+            <a:r>
+              <a:rPr lang="en-US" smtClean="0"/>
+              <a:t>k </a:t>
+            </a:r>
+            <a:r>
+              <a:rPr lang="en-US" dirty="0" smtClean="0"/>
+              <a:t>&lt; 100</a:t>
             </a:r>
             <a:endParaRPr lang="en-US" dirty="0"/>
           </a:p>

</xml_diff>

<commit_message>
updated lectures with typo fixes
</commit_message>
<xml_diff>
--- a/assets/ppt/codegen/ssaform3.pptx
+++ b/assets/ppt/codegen/ssaform3.pptx
@@ -5,10 +5,10 @@
     <p:sldMasterId id="2147483660" r:id="rId1"/>
   </p:sldMasterIdLst>
   <p:notesMasterIdLst>
-    <p:notesMasterId r:id="rId17"/>
+    <p:notesMasterId r:id="rId18"/>
   </p:notesMasterIdLst>
   <p:handoutMasterIdLst>
-    <p:handoutMasterId r:id="rId18"/>
+    <p:handoutMasterId r:id="rId19"/>
   </p:handoutMasterIdLst>
   <p:sldIdLst>
     <p:sldId id="350" r:id="rId2"/>
@@ -22,10 +22,11 @@
     <p:sldId id="335" r:id="rId10"/>
     <p:sldId id="332" r:id="rId11"/>
     <p:sldId id="351" r:id="rId12"/>
-    <p:sldId id="352" r:id="rId13"/>
-    <p:sldId id="353" r:id="rId14"/>
-    <p:sldId id="354" r:id="rId15"/>
-    <p:sldId id="355" r:id="rId16"/>
+    <p:sldId id="356" r:id="rId13"/>
+    <p:sldId id="352" r:id="rId14"/>
+    <p:sldId id="353" r:id="rId15"/>
+    <p:sldId id="354" r:id="rId16"/>
+    <p:sldId id="355" r:id="rId17"/>
   </p:sldIdLst>
   <p:sldSz cx="9144000" cy="6858000" type="screen4x3"/>
   <p:notesSz cx="6858000" cy="9144000"/>
@@ -256,7 +257,7 @@
             <a:fld id="{2A2B9AA4-819F-8549-A06A-E1B5D9D61F62}" type="datetimeFigureOut">
               <a:rPr lang="en-US" smtClean="0"/>
               <a:pPr/>
-              <a:t>7/18/19</a:t>
+              <a:t>8/8/19</a:t>
             </a:fld>
             <a:endParaRPr lang="en-US"/>
           </a:p>
@@ -1124,6 +1125,11 @@
         </p:txBody>
       </p:sp>
     </p:spTree>
+    <p:extLst>
+      <p:ext uri="{BB962C8B-B14F-4D97-AF65-F5344CB8AC3E}">
+        <p14:creationId xmlns:p14="http://schemas.microsoft.com/office/powerpoint/2010/main" val="3647897415"/>
+      </p:ext>
+    </p:extLst>
   </p:cSld>
   <p:clrMapOvr>
     <a:masterClrMapping/>
@@ -1169,6 +1175,90 @@
               <a:rPr lang="en-US"/>
               <a:pPr/>
               <a:t>13</a:t>
+            </a:fld>
+            <a:endParaRPr lang="en-US"/>
+          </a:p>
+        </p:txBody>
+      </p:sp>
+      <p:sp>
+        <p:nvSpPr>
+          <p:cNvPr id="241666" name="Rectangle 2"/>
+          <p:cNvSpPr>
+            <a:spLocks noGrp="1" noRot="1" noChangeAspect="1" noChangeArrowheads="1" noTextEdit="1"/>
+          </p:cNvSpPr>
+          <p:nvPr>
+            <p:ph type="sldImg"/>
+          </p:nvPr>
+        </p:nvSpPr>
+        <p:spPr>
+          <a:ln/>
+        </p:spPr>
+      </p:sp>
+      <p:sp>
+        <p:nvSpPr>
+          <p:cNvPr id="241667" name="Rectangle 3"/>
+          <p:cNvSpPr>
+            <a:spLocks noGrp="1" noChangeArrowheads="1"/>
+          </p:cNvSpPr>
+          <p:nvPr>
+            <p:ph type="body" idx="1"/>
+          </p:nvPr>
+        </p:nvSpPr>
+        <p:spPr/>
+        <p:txBody>
+          <a:bodyPr/>
+          <a:lstStyle/>
+          <a:p>
+            <a:endParaRPr lang="en-US"/>
+          </a:p>
+        </p:txBody>
+      </p:sp>
+    </p:spTree>
+  </p:cSld>
+  <p:clrMapOvr>
+    <a:masterClrMapping/>
+  </p:clrMapOvr>
+</p:notes>
+</file>
+
+<file path=ppt/notesSlides/notesSlide14.xml><?xml version="1.0" encoding="utf-8"?>
+<p:notes xmlns:a="http://schemas.openxmlformats.org/drawingml/2006/main" xmlns:r="http://schemas.openxmlformats.org/officeDocument/2006/relationships" xmlns:p="http://schemas.openxmlformats.org/presentationml/2006/main">
+  <p:cSld>
+    <p:spTree>
+      <p:nvGrpSpPr>
+        <p:cNvPr id="1" name=""/>
+        <p:cNvGrpSpPr/>
+        <p:nvPr/>
+      </p:nvGrpSpPr>
+      <p:grpSpPr>
+        <a:xfrm>
+          <a:off x="0" y="0"/>
+          <a:ext cx="0" cy="0"/>
+          <a:chOff x="0" y="0"/>
+          <a:chExt cx="0" cy="0"/>
+        </a:xfrm>
+      </p:grpSpPr>
+      <p:sp>
+        <p:nvSpPr>
+          <p:cNvPr id="7" name="Rectangle 7"/>
+          <p:cNvSpPr>
+            <a:spLocks noGrp="1" noChangeArrowheads="1"/>
+          </p:cNvSpPr>
+          <p:nvPr>
+            <p:ph type="sldNum" sz="quarter" idx="5"/>
+          </p:nvPr>
+        </p:nvSpPr>
+        <p:spPr>
+          <a:ln/>
+        </p:spPr>
+        <p:txBody>
+          <a:bodyPr/>
+          <a:lstStyle/>
+          <a:p>
+            <a:fld id="{0D160F6A-BB48-D14B-BF5E-9741EF3DA305}" type="slidenum">
+              <a:rPr lang="en-US"/>
+              <a:pPr/>
+              <a:t>14</a:t>
             </a:fld>
             <a:endParaRPr lang="en-US"/>
           </a:p>
@@ -7345,7 +7435,7 @@
         <p:spPr bwMode="auto">
           <a:xfrm>
             <a:off x="2089821" y="3573016"/>
-            <a:ext cx="1723849" cy="1200328"/>
+            <a:ext cx="1640593" cy="461665"/>
           </a:xfrm>
           <a:prstGeom prst="rect">
             <a:avLst/>
@@ -7374,65 +7464,7 @@
           <a:p>
             <a:r>
               <a:rPr lang="en-US" dirty="0"/>
-              <a:t>2: </a:t>
-            </a:r>
-            <a:r>
-              <a:rPr lang="en-US" dirty="0" err="1"/>
-              <a:t>i</a:t>
-            </a:r>
-            <a:r>
-              <a:rPr lang="en-US" dirty="0"/>
-              <a:t> = </a:t>
-            </a:r>
-            <a:r>
-              <a:rPr lang="en-US" dirty="0">
-                <a:sym typeface="Symbol" charset="2"/>
-              </a:rPr>
-              <a:t>(</a:t>
-            </a:r>
-            <a:r>
-              <a:rPr lang="en-US" dirty="0" err="1">
-                <a:sym typeface="Symbol" charset="2"/>
-              </a:rPr>
-              <a:t>i,i</a:t>
-            </a:r>
-            <a:r>
-              <a:rPr lang="en-US" dirty="0">
-                <a:sym typeface="Symbol" charset="2"/>
-              </a:rPr>
-              <a:t>)</a:t>
-            </a:r>
-            <a:endParaRPr lang="en-US" dirty="0"/>
-          </a:p>
-          <a:p>
-            <a:r>
-              <a:rPr lang="en-US" dirty="0"/>
-              <a:t>    k = </a:t>
-            </a:r>
-            <a:r>
-              <a:rPr lang="en-US" dirty="0">
-                <a:sym typeface="Symbol" charset="2"/>
-              </a:rPr>
-              <a:t>(</a:t>
-            </a:r>
-            <a:r>
-              <a:rPr lang="en-US" dirty="0" err="1">
-                <a:sym typeface="Symbol" charset="2"/>
-              </a:rPr>
-              <a:t>k,k</a:t>
-            </a:r>
-            <a:r>
-              <a:rPr lang="en-US" dirty="0">
-                <a:sym typeface="Symbol" charset="2"/>
-              </a:rPr>
-              <a:t>)</a:t>
-            </a:r>
-            <a:endParaRPr lang="en-US" dirty="0"/>
-          </a:p>
-          <a:p>
-            <a:r>
-              <a:rPr lang="en-US" dirty="0"/>
-              <a:t>    if </a:t>
+              <a:t>2: if </a:t>
             </a:r>
             <a:r>
               <a:rPr lang="en-US" dirty="0" err="1"/>
@@ -7456,7 +7488,7 @@
         </p:nvSpPr>
         <p:spPr bwMode="auto">
           <a:xfrm>
-            <a:off x="1138064" y="5301208"/>
+            <a:off x="1175421" y="4487416"/>
             <a:ext cx="1752600" cy="830997"/>
           </a:xfrm>
           <a:prstGeom prst="rect">
@@ -7518,7 +7550,7 @@
         <p:spPr bwMode="auto">
           <a:xfrm>
             <a:off x="2702189" y="3246368"/>
-            <a:ext cx="249557" cy="326648"/>
+            <a:ext cx="207929" cy="326648"/>
           </a:xfrm>
           <a:prstGeom prst="straightConnector1">
             <a:avLst/>
@@ -7547,8 +7579,8 @@
         </p:nvCxnSpPr>
         <p:spPr bwMode="auto">
           <a:xfrm flipH="1">
-            <a:off x="2014364" y="4773344"/>
-            <a:ext cx="937382" cy="527864"/>
+            <a:off x="2051721" y="4034681"/>
+            <a:ext cx="858397" cy="452735"/>
           </a:xfrm>
           <a:prstGeom prst="straightConnector1">
             <a:avLst/>
@@ -7575,7 +7607,7 @@
         </p:nvSpPr>
         <p:spPr bwMode="auto">
           <a:xfrm>
-            <a:off x="3347864" y="5301208"/>
+            <a:off x="3385221" y="4487416"/>
             <a:ext cx="1676400" cy="466725"/>
           </a:xfrm>
           <a:prstGeom prst="rect">
@@ -7622,8 +7654,8 @@
         </p:nvCxnSpPr>
         <p:spPr bwMode="auto">
           <a:xfrm>
-            <a:off x="2951746" y="4773344"/>
-            <a:ext cx="1234318" cy="527864"/>
+            <a:off x="2910118" y="4034681"/>
+            <a:ext cx="1313303" cy="452735"/>
           </a:xfrm>
           <a:prstGeom prst="straightConnector1">
             <a:avLst/>
@@ -7652,14 +7684,14 @@
         </p:nvCxnSpPr>
         <p:spPr bwMode="auto">
           <a:xfrm rot="5400000" flipH="1" flipV="1">
-            <a:off x="1203460" y="4383920"/>
-            <a:ext cx="2559189" cy="937382"/>
+            <a:off x="1608220" y="4016516"/>
+            <a:ext cx="1745397" cy="858397"/>
           </a:xfrm>
           <a:prstGeom prst="curvedConnector5">
             <a:avLst>
-              <a:gd name="adj1" fmla="val -8933"/>
-              <a:gd name="adj2" fmla="val 379321"/>
-              <a:gd name="adj3" fmla="val 108933"/>
+              <a:gd name="adj1" fmla="val -13097"/>
+              <a:gd name="adj2" fmla="val 406073"/>
+              <a:gd name="adj3" fmla="val 121850"/>
             </a:avLst>
           </a:prstGeom>
           <a:noFill/>
@@ -7897,194 +7929,10 @@
           </a:p>
         </p:txBody>
       </p:sp>
-      <p:sp>
-        <p:nvSpPr>
-          <p:cNvPr id="25" name="TextBox 24"/>
-          <p:cNvSpPr txBox="1"/>
-          <p:nvPr/>
-        </p:nvSpPr>
-        <p:spPr>
-          <a:xfrm>
-            <a:off x="107504" y="332656"/>
-            <a:ext cx="1837011" cy="707886"/>
-          </a:xfrm>
-          <a:prstGeom prst="rect">
-            <a:avLst/>
-          </a:prstGeom>
-          <a:solidFill>
-            <a:schemeClr val="accent6">
-              <a:lumMod val="60000"/>
-              <a:lumOff val="40000"/>
-            </a:schemeClr>
-          </a:solidFill>
-        </p:spPr>
-        <p:txBody>
-          <a:bodyPr wrap="none" rtlCol="0">
-            <a:spAutoFit/>
-          </a:bodyPr>
-          <a:lstStyle/>
-          <a:p>
-            <a:r>
-              <a:rPr lang="en-US" sz="2000" dirty="0"/>
-              <a:t>Variable </a:t>
-            </a:r>
-            <a:r>
-              <a:rPr lang="en-US" sz="2000" dirty="0" err="1"/>
-              <a:t>i,k</a:t>
-            </a:r>
-            <a:r>
-              <a:rPr lang="en-US" sz="2000" dirty="0"/>
-              <a:t> in 1</a:t>
-            </a:r>
-          </a:p>
-          <a:p>
-            <a:r>
-              <a:rPr lang="en-US" sz="2000" dirty="0"/>
-              <a:t>DF(1) = {} </a:t>
-            </a:r>
-          </a:p>
-        </p:txBody>
-      </p:sp>
-      <p:sp>
-        <p:nvSpPr>
-          <p:cNvPr id="26" name="TextBox 25"/>
-          <p:cNvSpPr txBox="1"/>
-          <p:nvPr/>
-        </p:nvSpPr>
-        <p:spPr>
-          <a:xfrm>
-            <a:off x="107504" y="1124744"/>
-            <a:ext cx="1630499" cy="707886"/>
-          </a:xfrm>
-          <a:prstGeom prst="rect">
-            <a:avLst/>
-          </a:prstGeom>
-          <a:solidFill>
-            <a:schemeClr val="accent6">
-              <a:lumMod val="60000"/>
-              <a:lumOff val="40000"/>
-            </a:schemeClr>
-          </a:solidFill>
-        </p:spPr>
-        <p:txBody>
-          <a:bodyPr wrap="none" rtlCol="0">
-            <a:spAutoFit/>
-          </a:bodyPr>
-          <a:lstStyle/>
-          <a:p>
-            <a:r>
-              <a:rPr lang="en-US" sz="2000" dirty="0"/>
-              <a:t>Variable </a:t>
-            </a:r>
-            <a:r>
-              <a:rPr lang="en-US" sz="2000" dirty="0" err="1"/>
-              <a:t>i</a:t>
-            </a:r>
-            <a:r>
-              <a:rPr lang="en-US" sz="2000" dirty="0"/>
-              <a:t> in 2</a:t>
-            </a:r>
-          </a:p>
-          <a:p>
-            <a:r>
-              <a:rPr lang="en-US" sz="2000" dirty="0"/>
-              <a:t>DF(2) = {2} </a:t>
-            </a:r>
-          </a:p>
-        </p:txBody>
-      </p:sp>
-      <p:sp>
-        <p:nvSpPr>
-          <p:cNvPr id="27" name="TextBox 26"/>
-          <p:cNvSpPr txBox="1"/>
-          <p:nvPr/>
-        </p:nvSpPr>
-        <p:spPr>
-          <a:xfrm>
-            <a:off x="107504" y="1988840"/>
-            <a:ext cx="1837011" cy="707886"/>
-          </a:xfrm>
-          <a:prstGeom prst="rect">
-            <a:avLst/>
-          </a:prstGeom>
-          <a:solidFill>
-            <a:schemeClr val="accent6">
-              <a:lumMod val="60000"/>
-              <a:lumOff val="40000"/>
-            </a:schemeClr>
-          </a:solidFill>
-        </p:spPr>
-        <p:txBody>
-          <a:bodyPr wrap="none" rtlCol="0">
-            <a:spAutoFit/>
-          </a:bodyPr>
-          <a:lstStyle/>
-          <a:p>
-            <a:r>
-              <a:rPr lang="en-US" sz="2000" dirty="0"/>
-              <a:t>Variable </a:t>
-            </a:r>
-            <a:r>
-              <a:rPr lang="en-US" sz="2000" dirty="0" err="1"/>
-              <a:t>i,k</a:t>
-            </a:r>
-            <a:r>
-              <a:rPr lang="en-US" sz="2000" dirty="0"/>
-              <a:t> in 3</a:t>
-            </a:r>
-          </a:p>
-          <a:p>
-            <a:r>
-              <a:rPr lang="en-US" sz="2000" dirty="0"/>
-              <a:t>DF(3) = {2} </a:t>
-            </a:r>
-          </a:p>
-        </p:txBody>
-      </p:sp>
-      <p:sp>
-        <p:nvSpPr>
-          <p:cNvPr id="32" name="TextBox 31"/>
-          <p:cNvSpPr txBox="1"/>
-          <p:nvPr/>
-        </p:nvSpPr>
-        <p:spPr>
-          <a:xfrm>
-            <a:off x="107504" y="2852936"/>
-            <a:ext cx="1731814" cy="707886"/>
-          </a:xfrm>
-          <a:prstGeom prst="rect">
-            <a:avLst/>
-          </a:prstGeom>
-          <a:solidFill>
-            <a:schemeClr val="accent6">
-              <a:lumMod val="60000"/>
-              <a:lumOff val="40000"/>
-            </a:schemeClr>
-          </a:solidFill>
-        </p:spPr>
-        <p:txBody>
-          <a:bodyPr wrap="none" rtlCol="0">
-            <a:spAutoFit/>
-          </a:bodyPr>
-          <a:lstStyle/>
-          <a:p>
-            <a:r>
-              <a:rPr lang="en-US" sz="2000" dirty="0"/>
-              <a:t>Variable k in 4</a:t>
-            </a:r>
-          </a:p>
-          <a:p>
-            <a:r>
-              <a:rPr lang="en-US" sz="2000" dirty="0"/>
-              <a:t>DF(4) = {} </a:t>
-            </a:r>
-          </a:p>
-        </p:txBody>
-      </p:sp>
     </p:spTree>
     <p:extLst>
       <p:ext uri="{BB962C8B-B14F-4D97-AF65-F5344CB8AC3E}">
-        <p14:creationId xmlns:p14="http://schemas.microsoft.com/office/powerpoint/2010/main" val="407226780"/>
+        <p14:creationId xmlns:p14="http://schemas.microsoft.com/office/powerpoint/2010/main" val="676870744"/>
       </p:ext>
     </p:extLst>
   </p:cSld>
@@ -8687,8 +8535,8 @@
         </p:nvSpPr>
         <p:spPr bwMode="auto">
           <a:xfrm>
-            <a:off x="3305573" y="1849760"/>
-            <a:ext cx="1683424" cy="892552"/>
+            <a:off x="1937421" y="2353816"/>
+            <a:ext cx="1529535" cy="892552"/>
           </a:xfrm>
           <a:prstGeom prst="rect">
             <a:avLst/>
@@ -8717,7 +8565,7 @@
           <a:p>
             <a:r>
               <a:rPr lang="en-US" dirty="0"/>
-              <a:t>1: k1 := 100</a:t>
+              <a:t>1: k := 100</a:t>
             </a:r>
           </a:p>
           <a:p>
@@ -8726,8 +8574,12 @@
               <a:t>    </a:t>
             </a:r>
             <a:r>
-              <a:rPr lang="en-US" dirty="0"/>
-              <a:t>i1 := 0</a:t>
+              <a:rPr lang="en-US" dirty="0" err="1"/>
+              <a:t>i</a:t>
+            </a:r>
+            <a:r>
+              <a:rPr lang="en-US" dirty="0"/>
+              <a:t> := 0</a:t>
             </a:r>
             <a:endParaRPr lang="en-US" sz="2800" dirty="0"/>
           </a:p>
@@ -8743,8 +8595,8 @@
         </p:nvSpPr>
         <p:spPr bwMode="auto">
           <a:xfrm>
-            <a:off x="3457973" y="3068960"/>
-            <a:ext cx="2185514" cy="1200328"/>
+            <a:off x="2089821" y="3573016"/>
+            <a:ext cx="1723849" cy="1200328"/>
           </a:xfrm>
           <a:prstGeom prst="rect">
             <a:avLst/>
@@ -8773,33 +8625,73 @@
           <a:p>
             <a:r>
               <a:rPr lang="en-US" dirty="0"/>
-              <a:t>2: i2 = </a:t>
+              <a:t>2: </a:t>
+            </a:r>
+            <a:r>
+              <a:rPr lang="en-US" dirty="0" err="1"/>
+              <a:t>i</a:t>
+            </a:r>
+            <a:r>
+              <a:rPr lang="en-US" dirty="0"/>
+              <a:t> = </a:t>
             </a:r>
             <a:r>
               <a:rPr lang="en-US" dirty="0">
                 <a:sym typeface="Symbol" charset="2"/>
               </a:rPr>
-              <a:t>(i1,i3)</a:t>
-            </a:r>
-            <a:endParaRPr lang="en-US" dirty="0"/>
-          </a:p>
-          <a:p>
-            <a:r>
-              <a:rPr lang="en-US" dirty="0"/>
-              <a:t>    k2 = </a:t>
+              <a:t>(</a:t>
+            </a:r>
+            <a:r>
+              <a:rPr lang="en-US" dirty="0" err="1">
+                <a:sym typeface="Symbol" charset="2"/>
+              </a:rPr>
+              <a:t>i,i</a:t>
             </a:r>
             <a:r>
               <a:rPr lang="en-US" dirty="0">
                 <a:sym typeface="Symbol" charset="2"/>
               </a:rPr>
-              <a:t>(k1,k3)</a:t>
+              <a:t>)</a:t>
             </a:r>
             <a:endParaRPr lang="en-US" dirty="0"/>
           </a:p>
           <a:p>
             <a:r>
               <a:rPr lang="en-US" dirty="0"/>
-              <a:t>    if i2 &lt; 100</a:t>
+              <a:t>    k = </a:t>
+            </a:r>
+            <a:r>
+              <a:rPr lang="en-US" dirty="0">
+                <a:sym typeface="Symbol" charset="2"/>
+              </a:rPr>
+              <a:t>(</a:t>
+            </a:r>
+            <a:r>
+              <a:rPr lang="en-US" dirty="0" err="1">
+                <a:sym typeface="Symbol" charset="2"/>
+              </a:rPr>
+              <a:t>k,k</a:t>
+            </a:r>
+            <a:r>
+              <a:rPr lang="en-US" dirty="0">
+                <a:sym typeface="Symbol" charset="2"/>
+              </a:rPr>
+              <a:t>)</a:t>
+            </a:r>
+            <a:endParaRPr lang="en-US" dirty="0"/>
+          </a:p>
+          <a:p>
+            <a:r>
+              <a:rPr lang="en-US" dirty="0"/>
+              <a:t>    if </a:t>
+            </a:r>
+            <a:r>
+              <a:rPr lang="en-US" dirty="0" err="1"/>
+              <a:t>i</a:t>
+            </a:r>
+            <a:r>
+              <a:rPr lang="en-US" dirty="0"/>
+              <a:t> &lt; 100</a:t>
             </a:r>
             <a:endParaRPr lang="en-US" sz="2800" dirty="0"/>
           </a:p>
@@ -8815,8 +8707,8 @@
         </p:nvSpPr>
         <p:spPr bwMode="auto">
           <a:xfrm>
-            <a:off x="2506216" y="4797152"/>
-            <a:ext cx="1993776" cy="830997"/>
+            <a:off x="1138064" y="5301208"/>
+            <a:ext cx="1752600" cy="830997"/>
           </a:xfrm>
           <a:prstGeom prst="rect">
             <a:avLst/>
@@ -8835,7 +8727,7 @@
           <a:effectLst/>
         </p:spPr>
         <p:txBody>
-          <a:bodyPr wrap="square">
+          <a:bodyPr>
             <a:prstTxWarp prst="textNoShape">
               <a:avLst/>
             </a:prstTxWarp>
@@ -8845,13 +8737,21 @@
           <a:p>
             <a:r>
               <a:rPr lang="en-US" dirty="0"/>
-              <a:t>3: k3 := k2+1</a:t>
-            </a:r>
-          </a:p>
-          <a:p>
-            <a:r>
-              <a:rPr lang="en-US" dirty="0"/>
-              <a:t>    i3 := i2+1</a:t>
+              <a:t>3: k := k+1</a:t>
+            </a:r>
+          </a:p>
+          <a:p>
+            <a:r>
+              <a:rPr lang="en-US" dirty="0"/>
+              <a:t>    </a:t>
+            </a:r>
+            <a:r>
+              <a:rPr lang="en-US" dirty="0" err="1"/>
+              <a:t>i</a:t>
+            </a:r>
+            <a:r>
+              <a:rPr lang="en-US" dirty="0"/>
+              <a:t> := i+1</a:t>
             </a:r>
           </a:p>
         </p:txBody>
@@ -8868,8 +8768,8 @@
         </p:nvCxnSpPr>
         <p:spPr bwMode="auto">
           <a:xfrm>
-            <a:off x="4147285" y="2742312"/>
-            <a:ext cx="403445" cy="326648"/>
+            <a:off x="2702189" y="3246368"/>
+            <a:ext cx="249557" cy="326648"/>
           </a:xfrm>
           <a:prstGeom prst="straightConnector1">
             <a:avLst/>
@@ -8898,8 +8798,8 @@
         </p:nvCxnSpPr>
         <p:spPr bwMode="auto">
           <a:xfrm flipH="1">
-            <a:off x="3503104" y="4269288"/>
-            <a:ext cx="1047626" cy="527864"/>
+            <a:off x="2014364" y="4773344"/>
+            <a:ext cx="937382" cy="527864"/>
           </a:xfrm>
           <a:prstGeom prst="straightConnector1">
             <a:avLst/>
@@ -8926,7 +8826,7 @@
         </p:nvSpPr>
         <p:spPr bwMode="auto">
           <a:xfrm>
-            <a:off x="4716016" y="4797152"/>
+            <a:off x="3347864" y="5301208"/>
             <a:ext cx="1676400" cy="466725"/>
           </a:xfrm>
           <a:prstGeom prst="rect">
@@ -8973,8 +8873,8 @@
         </p:nvCxnSpPr>
         <p:spPr bwMode="auto">
           <a:xfrm>
-            <a:off x="4550730" y="4269288"/>
-            <a:ext cx="1003486" cy="527864"/>
+            <a:off x="2951746" y="4773344"/>
+            <a:ext cx="1234318" cy="527864"/>
           </a:xfrm>
           <a:prstGeom prst="straightConnector1">
             <a:avLst/>
@@ -9003,13 +8903,13 @@
         </p:nvCxnSpPr>
         <p:spPr bwMode="auto">
           <a:xfrm rot="5400000" flipH="1" flipV="1">
-            <a:off x="2747322" y="3824742"/>
-            <a:ext cx="2559189" cy="1047626"/>
+            <a:off x="1203460" y="4383920"/>
+            <a:ext cx="2559189" cy="937382"/>
           </a:xfrm>
           <a:prstGeom prst="curvedConnector5">
             <a:avLst>
               <a:gd name="adj1" fmla="val -8933"/>
-              <a:gd name="adj2" fmla="val 334592"/>
+              <a:gd name="adj2" fmla="val 379321"/>
               <a:gd name="adj3" fmla="val 108933"/>
             </a:avLst>
           </a:prstGeom>
@@ -9025,16 +8925,943 @@
           <a:effectLst/>
         </p:spPr>
       </p:cxnSp>
+      <p:sp>
+        <p:nvSpPr>
+          <p:cNvPr id="22" name="TextBox 21"/>
+          <p:cNvSpPr txBox="1"/>
+          <p:nvPr/>
+        </p:nvSpPr>
+        <p:spPr>
+          <a:xfrm>
+            <a:off x="1907704" y="1628800"/>
+            <a:ext cx="2680992" cy="461665"/>
+          </a:xfrm>
+          <a:prstGeom prst="rect">
+            <a:avLst/>
+          </a:prstGeom>
+          <a:noFill/>
+        </p:spPr>
+        <p:txBody>
+          <a:bodyPr wrap="none" rtlCol="0">
+            <a:spAutoFit/>
+          </a:bodyPr>
+          <a:lstStyle/>
+          <a:p>
+            <a:r>
+              <a:rPr lang="en-US" dirty="0"/>
+              <a:t>Control Flow Graph</a:t>
+            </a:r>
+          </a:p>
+        </p:txBody>
+      </p:sp>
+      <p:sp>
+        <p:nvSpPr>
+          <p:cNvPr id="16" name="TextBox 15"/>
+          <p:cNvSpPr txBox="1"/>
+          <p:nvPr/>
+        </p:nvSpPr>
+        <p:spPr>
+          <a:xfrm>
+            <a:off x="5940152" y="2276872"/>
+            <a:ext cx="2095445" cy="1569660"/>
+          </a:xfrm>
+          <a:prstGeom prst="rect">
+            <a:avLst/>
+          </a:prstGeom>
+          <a:solidFill>
+            <a:schemeClr val="accent2">
+              <a:lumMod val="60000"/>
+              <a:lumOff val="40000"/>
+            </a:schemeClr>
+          </a:solidFill>
+        </p:spPr>
+        <p:txBody>
+          <a:bodyPr wrap="none" rtlCol="0">
+            <a:spAutoFit/>
+          </a:bodyPr>
+          <a:lstStyle/>
+          <a:p>
+            <a:pPr>
+              <a:buFont typeface="Arial"/>
+              <a:buChar char="•"/>
+            </a:pPr>
+            <a:r>
+              <a:rPr lang="en-US" dirty="0"/>
+              <a:t>D(1) = {2,3,4}</a:t>
+            </a:r>
+          </a:p>
+          <a:p>
+            <a:pPr>
+              <a:buFont typeface="Arial"/>
+              <a:buChar char="•"/>
+            </a:pPr>
+            <a:r>
+              <a:rPr lang="en-US" dirty="0"/>
+              <a:t>D(2) = {3,4}</a:t>
+            </a:r>
+          </a:p>
+          <a:p>
+            <a:pPr>
+              <a:buFont typeface="Arial"/>
+              <a:buChar char="•"/>
+            </a:pPr>
+            <a:r>
+              <a:rPr lang="en-US" dirty="0"/>
+              <a:t>D(3) = {}</a:t>
+            </a:r>
+          </a:p>
+          <a:p>
+            <a:pPr>
+              <a:buFont typeface="Arial"/>
+              <a:buChar char="•"/>
+            </a:pPr>
+            <a:r>
+              <a:rPr lang="en-US" dirty="0"/>
+              <a:t>D(4) = {}</a:t>
+            </a:r>
+          </a:p>
+        </p:txBody>
+      </p:sp>
+      <p:sp>
+        <p:nvSpPr>
+          <p:cNvPr id="17" name="TextBox 16"/>
+          <p:cNvSpPr txBox="1"/>
+          <p:nvPr/>
+        </p:nvSpPr>
+        <p:spPr>
+          <a:xfrm>
+            <a:off x="5796136" y="1628800"/>
+            <a:ext cx="2842846" cy="461665"/>
+          </a:xfrm>
+          <a:prstGeom prst="rect">
+            <a:avLst/>
+          </a:prstGeom>
+          <a:noFill/>
+        </p:spPr>
+        <p:txBody>
+          <a:bodyPr wrap="none" rtlCol="0">
+            <a:spAutoFit/>
+          </a:bodyPr>
+          <a:lstStyle/>
+          <a:p>
+            <a:r>
+              <a:rPr lang="en-US" dirty="0"/>
+              <a:t>Dominance Relations</a:t>
+            </a:r>
+          </a:p>
+        </p:txBody>
+      </p:sp>
+      <p:sp>
+        <p:nvSpPr>
+          <p:cNvPr id="23" name="TextBox 22"/>
+          <p:cNvSpPr txBox="1"/>
+          <p:nvPr/>
+        </p:nvSpPr>
+        <p:spPr>
+          <a:xfrm>
+            <a:off x="6100936" y="4538464"/>
+            <a:ext cx="1800493" cy="1569660"/>
+          </a:xfrm>
+          <a:prstGeom prst="rect">
+            <a:avLst/>
+          </a:prstGeom>
+          <a:solidFill>
+            <a:schemeClr val="accent2">
+              <a:lumMod val="60000"/>
+              <a:lumOff val="40000"/>
+            </a:schemeClr>
+          </a:solidFill>
+        </p:spPr>
+        <p:txBody>
+          <a:bodyPr wrap="none" rtlCol="0">
+            <a:spAutoFit/>
+          </a:bodyPr>
+          <a:lstStyle/>
+          <a:p>
+            <a:pPr>
+              <a:buFont typeface="Arial"/>
+              <a:buChar char="•"/>
+            </a:pPr>
+            <a:r>
+              <a:rPr lang="en-US" dirty="0"/>
+              <a:t>DF(1) = {}</a:t>
+            </a:r>
+          </a:p>
+          <a:p>
+            <a:pPr>
+              <a:buFont typeface="Arial"/>
+              <a:buChar char="•"/>
+            </a:pPr>
+            <a:r>
+              <a:rPr lang="en-US" dirty="0"/>
+              <a:t>DF(2) = {2}</a:t>
+            </a:r>
+          </a:p>
+          <a:p>
+            <a:pPr>
+              <a:buFont typeface="Arial"/>
+              <a:buChar char="•"/>
+            </a:pPr>
+            <a:r>
+              <a:rPr lang="en-US" dirty="0"/>
+              <a:t>DF(3) = {2}</a:t>
+            </a:r>
+          </a:p>
+          <a:p>
+            <a:pPr>
+              <a:buFont typeface="Arial"/>
+              <a:buChar char="•"/>
+            </a:pPr>
+            <a:r>
+              <a:rPr lang="en-US" dirty="0"/>
+              <a:t>DF(4) = {}</a:t>
+            </a:r>
+          </a:p>
+        </p:txBody>
+      </p:sp>
+      <p:sp>
+        <p:nvSpPr>
+          <p:cNvPr id="24" name="TextBox 23"/>
+          <p:cNvSpPr txBox="1"/>
+          <p:nvPr/>
+        </p:nvSpPr>
+        <p:spPr>
+          <a:xfrm>
+            <a:off x="5796136" y="4005064"/>
+            <a:ext cx="2672526" cy="461665"/>
+          </a:xfrm>
+          <a:prstGeom prst="rect">
+            <a:avLst/>
+          </a:prstGeom>
+          <a:noFill/>
+        </p:spPr>
+        <p:txBody>
+          <a:bodyPr wrap="none" rtlCol="0">
+            <a:spAutoFit/>
+          </a:bodyPr>
+          <a:lstStyle/>
+          <a:p>
+            <a:r>
+              <a:rPr lang="en-US" dirty="0"/>
+              <a:t>Dominance Frontier</a:t>
+            </a:r>
+          </a:p>
+        </p:txBody>
+      </p:sp>
+      <p:sp>
+        <p:nvSpPr>
+          <p:cNvPr id="25" name="TextBox 24"/>
+          <p:cNvSpPr txBox="1"/>
+          <p:nvPr/>
+        </p:nvSpPr>
+        <p:spPr>
+          <a:xfrm>
+            <a:off x="107504" y="332656"/>
+            <a:ext cx="1837011" cy="707886"/>
+          </a:xfrm>
+          <a:prstGeom prst="rect">
+            <a:avLst/>
+          </a:prstGeom>
+          <a:solidFill>
+            <a:schemeClr val="accent6">
+              <a:lumMod val="60000"/>
+              <a:lumOff val="40000"/>
+            </a:schemeClr>
+          </a:solidFill>
+        </p:spPr>
+        <p:txBody>
+          <a:bodyPr wrap="none" rtlCol="0">
+            <a:spAutoFit/>
+          </a:bodyPr>
+          <a:lstStyle/>
+          <a:p>
+            <a:r>
+              <a:rPr lang="en-US" sz="2000" dirty="0"/>
+              <a:t>Variable </a:t>
+            </a:r>
+            <a:r>
+              <a:rPr lang="en-US" sz="2000" dirty="0" err="1"/>
+              <a:t>i,k</a:t>
+            </a:r>
+            <a:r>
+              <a:rPr lang="en-US" sz="2000" dirty="0"/>
+              <a:t> in 1</a:t>
+            </a:r>
+          </a:p>
+          <a:p>
+            <a:r>
+              <a:rPr lang="en-US" sz="2000" dirty="0"/>
+              <a:t>DF(1) = {} </a:t>
+            </a:r>
+          </a:p>
+        </p:txBody>
+      </p:sp>
+      <p:sp>
+        <p:nvSpPr>
+          <p:cNvPr id="26" name="TextBox 25"/>
+          <p:cNvSpPr txBox="1"/>
+          <p:nvPr/>
+        </p:nvSpPr>
+        <p:spPr>
+          <a:xfrm>
+            <a:off x="107504" y="1124744"/>
+            <a:ext cx="1630499" cy="707886"/>
+          </a:xfrm>
+          <a:prstGeom prst="rect">
+            <a:avLst/>
+          </a:prstGeom>
+          <a:solidFill>
+            <a:schemeClr val="accent6">
+              <a:lumMod val="60000"/>
+              <a:lumOff val="40000"/>
+            </a:schemeClr>
+          </a:solidFill>
+        </p:spPr>
+        <p:txBody>
+          <a:bodyPr wrap="none" rtlCol="0">
+            <a:spAutoFit/>
+          </a:bodyPr>
+          <a:lstStyle/>
+          <a:p>
+            <a:r>
+              <a:rPr lang="en-US" sz="2000" dirty="0"/>
+              <a:t>Variable </a:t>
+            </a:r>
+            <a:r>
+              <a:rPr lang="en-US" sz="2000" dirty="0" err="1"/>
+              <a:t>i</a:t>
+            </a:r>
+            <a:r>
+              <a:rPr lang="en-US" sz="2000" dirty="0"/>
+              <a:t> in 2</a:t>
+            </a:r>
+          </a:p>
+          <a:p>
+            <a:r>
+              <a:rPr lang="en-US" sz="2000" dirty="0"/>
+              <a:t>DF(2) = {2} </a:t>
+            </a:r>
+          </a:p>
+        </p:txBody>
+      </p:sp>
+      <p:sp>
+        <p:nvSpPr>
+          <p:cNvPr id="27" name="TextBox 26"/>
+          <p:cNvSpPr txBox="1"/>
+          <p:nvPr/>
+        </p:nvSpPr>
+        <p:spPr>
+          <a:xfrm>
+            <a:off x="107504" y="1988840"/>
+            <a:ext cx="1837011" cy="707886"/>
+          </a:xfrm>
+          <a:prstGeom prst="rect">
+            <a:avLst/>
+          </a:prstGeom>
+          <a:solidFill>
+            <a:schemeClr val="accent6">
+              <a:lumMod val="60000"/>
+              <a:lumOff val="40000"/>
+            </a:schemeClr>
+          </a:solidFill>
+        </p:spPr>
+        <p:txBody>
+          <a:bodyPr wrap="none" rtlCol="0">
+            <a:spAutoFit/>
+          </a:bodyPr>
+          <a:lstStyle/>
+          <a:p>
+            <a:r>
+              <a:rPr lang="en-US" sz="2000" dirty="0"/>
+              <a:t>Variable </a:t>
+            </a:r>
+            <a:r>
+              <a:rPr lang="en-US" sz="2000" dirty="0" err="1"/>
+              <a:t>i,k</a:t>
+            </a:r>
+            <a:r>
+              <a:rPr lang="en-US" sz="2000" dirty="0"/>
+              <a:t> in 3</a:t>
+            </a:r>
+          </a:p>
+          <a:p>
+            <a:r>
+              <a:rPr lang="en-US" sz="2000" dirty="0"/>
+              <a:t>DF(3) = {2} </a:t>
+            </a:r>
+          </a:p>
+        </p:txBody>
+      </p:sp>
+      <p:sp>
+        <p:nvSpPr>
+          <p:cNvPr id="32" name="TextBox 31"/>
+          <p:cNvSpPr txBox="1"/>
+          <p:nvPr/>
+        </p:nvSpPr>
+        <p:spPr>
+          <a:xfrm>
+            <a:off x="107504" y="2852936"/>
+            <a:ext cx="1731814" cy="707886"/>
+          </a:xfrm>
+          <a:prstGeom prst="rect">
+            <a:avLst/>
+          </a:prstGeom>
+          <a:solidFill>
+            <a:schemeClr val="accent6">
+              <a:lumMod val="60000"/>
+              <a:lumOff val="40000"/>
+            </a:schemeClr>
+          </a:solidFill>
+        </p:spPr>
+        <p:txBody>
+          <a:bodyPr wrap="none" rtlCol="0">
+            <a:spAutoFit/>
+          </a:bodyPr>
+          <a:lstStyle/>
+          <a:p>
+            <a:r>
+              <a:rPr lang="en-US" sz="2000" dirty="0"/>
+              <a:t>Variable k in 4</a:t>
+            </a:r>
+          </a:p>
+          <a:p>
+            <a:r>
+              <a:rPr lang="en-US" sz="2000" dirty="0"/>
+              <a:t>DF(4) = {} </a:t>
+            </a:r>
+          </a:p>
+        </p:txBody>
+      </p:sp>
     </p:spTree>
     <p:extLst>
       <p:ext uri="{BB962C8B-B14F-4D97-AF65-F5344CB8AC3E}">
-        <p14:creationId xmlns:p14="http://schemas.microsoft.com/office/powerpoint/2010/main" val="3492114016"/>
+        <p14:creationId xmlns:p14="http://schemas.microsoft.com/office/powerpoint/2010/main" val="407226780"/>
       </p:ext>
     </p:extLst>
   </p:cSld>
   <p:clrMapOvr>
     <a:masterClrMapping/>
   </p:clrMapOvr>
+  <p:timing>
+    <p:tnLst>
+      <p:par>
+        <p:cTn id="1" dur="indefinite" restart="never" nodeType="tmRoot">
+          <p:childTnLst>
+            <p:seq concurrent="1" nextAc="seek">
+              <p:cTn id="2" dur="indefinite" nodeType="mainSeq">
+                <p:childTnLst>
+                  <p:par>
+                    <p:cTn id="3" fill="hold">
+                      <p:stCondLst>
+                        <p:cond delay="indefinite"/>
+                      </p:stCondLst>
+                      <p:childTnLst>
+                        <p:par>
+                          <p:cTn id="4" fill="hold">
+                            <p:stCondLst>
+                              <p:cond delay="0"/>
+                            </p:stCondLst>
+                            <p:childTnLst>
+                              <p:par>
+                                <p:cTn id="5" presetID="1" presetClass="entr" presetSubtype="0" fill="hold" grpId="0" nodeType="clickEffect">
+                                  <p:stCondLst>
+                                    <p:cond delay="0"/>
+                                  </p:stCondLst>
+                                  <p:childTnLst>
+                                    <p:set>
+                                      <p:cBhvr>
+                                        <p:cTn id="6" dur="1" fill="hold">
+                                          <p:stCondLst>
+                                            <p:cond delay="0"/>
+                                          </p:stCondLst>
+                                        </p:cTn>
+                                        <p:tgtEl>
+                                          <p:spTgt spid="16">
+                                            <p:bg/>
+                                          </p:spTgt>
+                                        </p:tgtEl>
+                                        <p:attrNameLst>
+                                          <p:attrName>style.visibility</p:attrName>
+                                        </p:attrNameLst>
+                                      </p:cBhvr>
+                                      <p:to>
+                                        <p:strVal val="visible"/>
+                                      </p:to>
+                                    </p:set>
+                                  </p:childTnLst>
+                                </p:cTn>
+                              </p:par>
+                            </p:childTnLst>
+                          </p:cTn>
+                        </p:par>
+                      </p:childTnLst>
+                    </p:cTn>
+                  </p:par>
+                  <p:par>
+                    <p:cTn id="7" fill="hold">
+                      <p:stCondLst>
+                        <p:cond delay="indefinite"/>
+                      </p:stCondLst>
+                      <p:childTnLst>
+                        <p:par>
+                          <p:cTn id="8" fill="hold">
+                            <p:stCondLst>
+                              <p:cond delay="0"/>
+                            </p:stCondLst>
+                            <p:childTnLst>
+                              <p:par>
+                                <p:cTn id="9" presetID="1" presetClass="entr" presetSubtype="0" fill="hold" grpId="0" nodeType="clickEffect">
+                                  <p:stCondLst>
+                                    <p:cond delay="0"/>
+                                  </p:stCondLst>
+                                  <p:childTnLst>
+                                    <p:set>
+                                      <p:cBhvr>
+                                        <p:cTn id="10" dur="1" fill="hold">
+                                          <p:stCondLst>
+                                            <p:cond delay="0"/>
+                                          </p:stCondLst>
+                                        </p:cTn>
+                                        <p:tgtEl>
+                                          <p:spTgt spid="16">
+                                            <p:txEl>
+                                              <p:pRg st="0" end="0"/>
+                                            </p:txEl>
+                                          </p:spTgt>
+                                        </p:tgtEl>
+                                        <p:attrNameLst>
+                                          <p:attrName>style.visibility</p:attrName>
+                                        </p:attrNameLst>
+                                      </p:cBhvr>
+                                      <p:to>
+                                        <p:strVal val="visible"/>
+                                      </p:to>
+                                    </p:set>
+                                  </p:childTnLst>
+                                </p:cTn>
+                              </p:par>
+                            </p:childTnLst>
+                          </p:cTn>
+                        </p:par>
+                      </p:childTnLst>
+                    </p:cTn>
+                  </p:par>
+                  <p:par>
+                    <p:cTn id="11" fill="hold">
+                      <p:stCondLst>
+                        <p:cond delay="indefinite"/>
+                      </p:stCondLst>
+                      <p:childTnLst>
+                        <p:par>
+                          <p:cTn id="12" fill="hold">
+                            <p:stCondLst>
+                              <p:cond delay="0"/>
+                            </p:stCondLst>
+                            <p:childTnLst>
+                              <p:par>
+                                <p:cTn id="13" presetID="1" presetClass="entr" presetSubtype="0" fill="hold" grpId="0" nodeType="clickEffect">
+                                  <p:stCondLst>
+                                    <p:cond delay="0"/>
+                                  </p:stCondLst>
+                                  <p:childTnLst>
+                                    <p:set>
+                                      <p:cBhvr>
+                                        <p:cTn id="14" dur="1" fill="hold">
+                                          <p:stCondLst>
+                                            <p:cond delay="0"/>
+                                          </p:stCondLst>
+                                        </p:cTn>
+                                        <p:tgtEl>
+                                          <p:spTgt spid="16">
+                                            <p:txEl>
+                                              <p:pRg st="1" end="1"/>
+                                            </p:txEl>
+                                          </p:spTgt>
+                                        </p:tgtEl>
+                                        <p:attrNameLst>
+                                          <p:attrName>style.visibility</p:attrName>
+                                        </p:attrNameLst>
+                                      </p:cBhvr>
+                                      <p:to>
+                                        <p:strVal val="visible"/>
+                                      </p:to>
+                                    </p:set>
+                                  </p:childTnLst>
+                                </p:cTn>
+                              </p:par>
+                            </p:childTnLst>
+                          </p:cTn>
+                        </p:par>
+                      </p:childTnLst>
+                    </p:cTn>
+                  </p:par>
+                  <p:par>
+                    <p:cTn id="15" fill="hold">
+                      <p:stCondLst>
+                        <p:cond delay="indefinite"/>
+                      </p:stCondLst>
+                      <p:childTnLst>
+                        <p:par>
+                          <p:cTn id="16" fill="hold">
+                            <p:stCondLst>
+                              <p:cond delay="0"/>
+                            </p:stCondLst>
+                            <p:childTnLst>
+                              <p:par>
+                                <p:cTn id="17" presetID="1" presetClass="entr" presetSubtype="0" fill="hold" grpId="0" nodeType="clickEffect">
+                                  <p:stCondLst>
+                                    <p:cond delay="0"/>
+                                  </p:stCondLst>
+                                  <p:childTnLst>
+                                    <p:set>
+                                      <p:cBhvr>
+                                        <p:cTn id="18" dur="1" fill="hold">
+                                          <p:stCondLst>
+                                            <p:cond delay="0"/>
+                                          </p:stCondLst>
+                                        </p:cTn>
+                                        <p:tgtEl>
+                                          <p:spTgt spid="16">
+                                            <p:txEl>
+                                              <p:pRg st="2" end="2"/>
+                                            </p:txEl>
+                                          </p:spTgt>
+                                        </p:tgtEl>
+                                        <p:attrNameLst>
+                                          <p:attrName>style.visibility</p:attrName>
+                                        </p:attrNameLst>
+                                      </p:cBhvr>
+                                      <p:to>
+                                        <p:strVal val="visible"/>
+                                      </p:to>
+                                    </p:set>
+                                  </p:childTnLst>
+                                </p:cTn>
+                              </p:par>
+                            </p:childTnLst>
+                          </p:cTn>
+                        </p:par>
+                      </p:childTnLst>
+                    </p:cTn>
+                  </p:par>
+                  <p:par>
+                    <p:cTn id="19" fill="hold">
+                      <p:stCondLst>
+                        <p:cond delay="indefinite"/>
+                      </p:stCondLst>
+                      <p:childTnLst>
+                        <p:par>
+                          <p:cTn id="20" fill="hold">
+                            <p:stCondLst>
+                              <p:cond delay="0"/>
+                            </p:stCondLst>
+                            <p:childTnLst>
+                              <p:par>
+                                <p:cTn id="21" presetID="1" presetClass="entr" presetSubtype="0" fill="hold" grpId="0" nodeType="clickEffect">
+                                  <p:stCondLst>
+                                    <p:cond delay="0"/>
+                                  </p:stCondLst>
+                                  <p:childTnLst>
+                                    <p:set>
+                                      <p:cBhvr>
+                                        <p:cTn id="22" dur="1" fill="hold">
+                                          <p:stCondLst>
+                                            <p:cond delay="0"/>
+                                          </p:stCondLst>
+                                        </p:cTn>
+                                        <p:tgtEl>
+                                          <p:spTgt spid="16">
+                                            <p:txEl>
+                                              <p:pRg st="3" end="3"/>
+                                            </p:txEl>
+                                          </p:spTgt>
+                                        </p:tgtEl>
+                                        <p:attrNameLst>
+                                          <p:attrName>style.visibility</p:attrName>
+                                        </p:attrNameLst>
+                                      </p:cBhvr>
+                                      <p:to>
+                                        <p:strVal val="visible"/>
+                                      </p:to>
+                                    </p:set>
+                                  </p:childTnLst>
+                                </p:cTn>
+                              </p:par>
+                            </p:childTnLst>
+                          </p:cTn>
+                        </p:par>
+                      </p:childTnLst>
+                    </p:cTn>
+                  </p:par>
+                  <p:par>
+                    <p:cTn id="23" fill="hold">
+                      <p:stCondLst>
+                        <p:cond delay="indefinite"/>
+                      </p:stCondLst>
+                      <p:childTnLst>
+                        <p:par>
+                          <p:cTn id="24" fill="hold">
+                            <p:stCondLst>
+                              <p:cond delay="0"/>
+                            </p:stCondLst>
+                            <p:childTnLst>
+                              <p:par>
+                                <p:cTn id="25" presetID="1" presetClass="entr" presetSubtype="0" fill="hold" grpId="0" nodeType="clickEffect">
+                                  <p:stCondLst>
+                                    <p:cond delay="0"/>
+                                  </p:stCondLst>
+                                  <p:childTnLst>
+                                    <p:set>
+                                      <p:cBhvr>
+                                        <p:cTn id="26" dur="1" fill="hold">
+                                          <p:stCondLst>
+                                            <p:cond delay="0"/>
+                                          </p:stCondLst>
+                                        </p:cTn>
+                                        <p:tgtEl>
+                                          <p:spTgt spid="23">
+                                            <p:bg/>
+                                          </p:spTgt>
+                                        </p:tgtEl>
+                                        <p:attrNameLst>
+                                          <p:attrName>style.visibility</p:attrName>
+                                        </p:attrNameLst>
+                                      </p:cBhvr>
+                                      <p:to>
+                                        <p:strVal val="visible"/>
+                                      </p:to>
+                                    </p:set>
+                                  </p:childTnLst>
+                                </p:cTn>
+                              </p:par>
+                            </p:childTnLst>
+                          </p:cTn>
+                        </p:par>
+                      </p:childTnLst>
+                    </p:cTn>
+                  </p:par>
+                  <p:par>
+                    <p:cTn id="27" fill="hold">
+                      <p:stCondLst>
+                        <p:cond delay="indefinite"/>
+                      </p:stCondLst>
+                      <p:childTnLst>
+                        <p:par>
+                          <p:cTn id="28" fill="hold">
+                            <p:stCondLst>
+                              <p:cond delay="0"/>
+                            </p:stCondLst>
+                            <p:childTnLst>
+                              <p:par>
+                                <p:cTn id="29" presetID="1" presetClass="entr" presetSubtype="0" fill="hold" grpId="0" nodeType="clickEffect">
+                                  <p:stCondLst>
+                                    <p:cond delay="0"/>
+                                  </p:stCondLst>
+                                  <p:childTnLst>
+                                    <p:set>
+                                      <p:cBhvr>
+                                        <p:cTn id="30" dur="1" fill="hold">
+                                          <p:stCondLst>
+                                            <p:cond delay="0"/>
+                                          </p:stCondLst>
+                                        </p:cTn>
+                                        <p:tgtEl>
+                                          <p:spTgt spid="23">
+                                            <p:txEl>
+                                              <p:pRg st="0" end="0"/>
+                                            </p:txEl>
+                                          </p:spTgt>
+                                        </p:tgtEl>
+                                        <p:attrNameLst>
+                                          <p:attrName>style.visibility</p:attrName>
+                                        </p:attrNameLst>
+                                      </p:cBhvr>
+                                      <p:to>
+                                        <p:strVal val="visible"/>
+                                      </p:to>
+                                    </p:set>
+                                  </p:childTnLst>
+                                </p:cTn>
+                              </p:par>
+                            </p:childTnLst>
+                          </p:cTn>
+                        </p:par>
+                      </p:childTnLst>
+                    </p:cTn>
+                  </p:par>
+                  <p:par>
+                    <p:cTn id="31" fill="hold">
+                      <p:stCondLst>
+                        <p:cond delay="indefinite"/>
+                      </p:stCondLst>
+                      <p:childTnLst>
+                        <p:par>
+                          <p:cTn id="32" fill="hold">
+                            <p:stCondLst>
+                              <p:cond delay="0"/>
+                            </p:stCondLst>
+                            <p:childTnLst>
+                              <p:par>
+                                <p:cTn id="33" presetID="1" presetClass="entr" presetSubtype="0" fill="hold" grpId="0" nodeType="clickEffect">
+                                  <p:stCondLst>
+                                    <p:cond delay="0"/>
+                                  </p:stCondLst>
+                                  <p:childTnLst>
+                                    <p:set>
+                                      <p:cBhvr>
+                                        <p:cTn id="34" dur="1" fill="hold">
+                                          <p:stCondLst>
+                                            <p:cond delay="0"/>
+                                          </p:stCondLst>
+                                        </p:cTn>
+                                        <p:tgtEl>
+                                          <p:spTgt spid="23">
+                                            <p:txEl>
+                                              <p:pRg st="1" end="1"/>
+                                            </p:txEl>
+                                          </p:spTgt>
+                                        </p:tgtEl>
+                                        <p:attrNameLst>
+                                          <p:attrName>style.visibility</p:attrName>
+                                        </p:attrNameLst>
+                                      </p:cBhvr>
+                                      <p:to>
+                                        <p:strVal val="visible"/>
+                                      </p:to>
+                                    </p:set>
+                                  </p:childTnLst>
+                                </p:cTn>
+                              </p:par>
+                            </p:childTnLst>
+                          </p:cTn>
+                        </p:par>
+                      </p:childTnLst>
+                    </p:cTn>
+                  </p:par>
+                  <p:par>
+                    <p:cTn id="35" fill="hold">
+                      <p:stCondLst>
+                        <p:cond delay="indefinite"/>
+                      </p:stCondLst>
+                      <p:childTnLst>
+                        <p:par>
+                          <p:cTn id="36" fill="hold">
+                            <p:stCondLst>
+                              <p:cond delay="0"/>
+                            </p:stCondLst>
+                            <p:childTnLst>
+                              <p:par>
+                                <p:cTn id="37" presetID="1" presetClass="entr" presetSubtype="0" fill="hold" grpId="0" nodeType="clickEffect">
+                                  <p:stCondLst>
+                                    <p:cond delay="0"/>
+                                  </p:stCondLst>
+                                  <p:childTnLst>
+                                    <p:set>
+                                      <p:cBhvr>
+                                        <p:cTn id="38" dur="1" fill="hold">
+                                          <p:stCondLst>
+                                            <p:cond delay="0"/>
+                                          </p:stCondLst>
+                                        </p:cTn>
+                                        <p:tgtEl>
+                                          <p:spTgt spid="23">
+                                            <p:txEl>
+                                              <p:pRg st="2" end="2"/>
+                                            </p:txEl>
+                                          </p:spTgt>
+                                        </p:tgtEl>
+                                        <p:attrNameLst>
+                                          <p:attrName>style.visibility</p:attrName>
+                                        </p:attrNameLst>
+                                      </p:cBhvr>
+                                      <p:to>
+                                        <p:strVal val="visible"/>
+                                      </p:to>
+                                    </p:set>
+                                  </p:childTnLst>
+                                </p:cTn>
+                              </p:par>
+                            </p:childTnLst>
+                          </p:cTn>
+                        </p:par>
+                      </p:childTnLst>
+                    </p:cTn>
+                  </p:par>
+                  <p:par>
+                    <p:cTn id="39" fill="hold">
+                      <p:stCondLst>
+                        <p:cond delay="indefinite"/>
+                      </p:stCondLst>
+                      <p:childTnLst>
+                        <p:par>
+                          <p:cTn id="40" fill="hold">
+                            <p:stCondLst>
+                              <p:cond delay="0"/>
+                            </p:stCondLst>
+                            <p:childTnLst>
+                              <p:par>
+                                <p:cTn id="41" presetID="1" presetClass="entr" presetSubtype="0" fill="hold" grpId="0" nodeType="clickEffect">
+                                  <p:stCondLst>
+                                    <p:cond delay="0"/>
+                                  </p:stCondLst>
+                                  <p:childTnLst>
+                                    <p:set>
+                                      <p:cBhvr>
+                                        <p:cTn id="42" dur="1" fill="hold">
+                                          <p:stCondLst>
+                                            <p:cond delay="0"/>
+                                          </p:stCondLst>
+                                        </p:cTn>
+                                        <p:tgtEl>
+                                          <p:spTgt spid="23">
+                                            <p:txEl>
+                                              <p:pRg st="3" end="3"/>
+                                            </p:txEl>
+                                          </p:spTgt>
+                                        </p:tgtEl>
+                                        <p:attrNameLst>
+                                          <p:attrName>style.visibility</p:attrName>
+                                        </p:attrNameLst>
+                                      </p:cBhvr>
+                                      <p:to>
+                                        <p:strVal val="visible"/>
+                                      </p:to>
+                                    </p:set>
+                                  </p:childTnLst>
+                                </p:cTn>
+                              </p:par>
+                            </p:childTnLst>
+                          </p:cTn>
+                        </p:par>
+                      </p:childTnLst>
+                    </p:cTn>
+                  </p:par>
+                </p:childTnLst>
+              </p:cTn>
+              <p:prevCondLst>
+                <p:cond evt="onPrev" delay="0">
+                  <p:tgtEl>
+                    <p:sldTgt/>
+                  </p:tgtEl>
+                </p:cond>
+              </p:prevCondLst>
+              <p:nextCondLst>
+                <p:cond evt="onNext" delay="0">
+                  <p:tgtEl>
+                    <p:sldTgt/>
+                  </p:tgtEl>
+                </p:cond>
+              </p:nextCondLst>
+            </p:seq>
+          </p:childTnLst>
+        </p:cTn>
+      </p:par>
+    </p:tnLst>
+    <p:bldLst>
+      <p:bldP spid="16" grpId="0" build="p" animBg="1"/>
+      <p:bldP spid="23" grpId="0" build="p" animBg="1"/>
+    </p:bldLst>
+  </p:timing>
 </p:sld>
 </file>
 
@@ -9057,7 +9884,53 @@
       </p:grpSpPr>
       <p:sp>
         <p:nvSpPr>
-          <p:cNvPr id="5" name="Text Box 4"/>
+          <p:cNvPr id="222210" name="Rectangle 2"/>
+          <p:cNvSpPr>
+            <a:spLocks noGrp="1" noChangeArrowheads="1"/>
+          </p:cNvSpPr>
+          <p:nvPr>
+            <p:ph type="title"/>
+          </p:nvPr>
+        </p:nvSpPr>
+        <p:spPr/>
+        <p:txBody>
+          <a:bodyPr/>
+          <a:lstStyle/>
+          <a:p>
+            <a:r>
+              <a:rPr lang="en-US" dirty="0"/>
+              <a:t>Converting to SSA Form</a:t>
+            </a:r>
+          </a:p>
+        </p:txBody>
+      </p:sp>
+      <p:sp>
+        <p:nvSpPr>
+          <p:cNvPr id="19" name="Slide Number Placeholder 4"/>
+          <p:cNvSpPr>
+            <a:spLocks noGrp="1"/>
+          </p:cNvSpPr>
+          <p:nvPr>
+            <p:ph type="sldNum" sz="quarter" idx="11"/>
+          </p:nvPr>
+        </p:nvSpPr>
+        <p:spPr/>
+        <p:txBody>
+          <a:bodyPr/>
+          <a:lstStyle/>
+          <a:p>
+            <a:fld id="{722DCBB7-0D72-414E-9F56-266DA4AACC86}" type="slidenum">
+              <a:rPr lang="en-US"/>
+              <a:pPr/>
+              <a:t>14</a:t>
+            </a:fld>
+            <a:endParaRPr lang="en-US"/>
+          </a:p>
+        </p:txBody>
+      </p:sp>
+      <p:sp>
+        <p:nvSpPr>
+          <p:cNvPr id="222212" name="Text Box 4"/>
           <p:cNvSpPr txBox="1">
             <a:spLocks noChangeArrowheads="1"/>
           </p:cNvSpPr>
@@ -9065,8 +9938,8 @@
         </p:nvSpPr>
         <p:spPr bwMode="auto">
           <a:xfrm>
-            <a:off x="3563888" y="1340768"/>
-            <a:ext cx="1290137" cy="1261884"/>
+            <a:off x="3305573" y="1849760"/>
+            <a:ext cx="1683424" cy="892552"/>
           </a:xfrm>
           <a:prstGeom prst="rect">
             <a:avLst/>
@@ -9095,38 +9968,25 @@
           <a:p>
             <a:r>
               <a:rPr lang="en-US" dirty="0"/>
-              <a:t>1: </a:t>
-            </a:r>
-            <a:r>
-              <a:rPr lang="en-US" dirty="0" err="1"/>
-              <a:t>i</a:t>
-            </a:r>
-            <a:r>
-              <a:rPr lang="en-US" dirty="0"/>
-              <a:t> := 1</a:t>
+              <a:t>1: k1 := 100</a:t>
             </a:r>
           </a:p>
           <a:p>
             <a:r>
               <a:rPr lang="en-US" sz="2800" dirty="0"/>
-              <a:t>   </a:t>
-            </a:r>
-            <a:r>
-              <a:rPr lang="en-US" dirty="0"/>
-              <a:t>j := 2</a:t>
-            </a:r>
-          </a:p>
-          <a:p>
-            <a:r>
-              <a:rPr lang="en-US" dirty="0"/>
-              <a:t>   k := 10</a:t>
-            </a:r>
-          </a:p>
-        </p:txBody>
-      </p:sp>
-      <p:sp>
-        <p:nvSpPr>
-          <p:cNvPr id="6" name="Text Box 4"/>
+              <a:t>    </a:t>
+            </a:r>
+            <a:r>
+              <a:rPr lang="en-US" dirty="0"/>
+              <a:t>i1 := 0</a:t>
+            </a:r>
+            <a:endParaRPr lang="en-US" sz="2800" dirty="0"/>
+          </a:p>
+        </p:txBody>
+      </p:sp>
+      <p:sp>
+        <p:nvSpPr>
+          <p:cNvPr id="222213" name="Text Box 5"/>
           <p:cNvSpPr txBox="1">
             <a:spLocks noChangeArrowheads="1"/>
           </p:cNvSpPr>
@@ -9134,8 +9994,8 @@
         </p:nvSpPr>
         <p:spPr bwMode="auto">
           <a:xfrm>
-            <a:off x="3851920" y="404664"/>
-            <a:ext cx="817051" cy="461665"/>
+            <a:off x="3457973" y="3068960"/>
+            <a:ext cx="2185514" cy="1200328"/>
           </a:xfrm>
           <a:prstGeom prst="rect">
             <a:avLst/>
@@ -9164,47 +10024,41 @@
           <a:p>
             <a:r>
               <a:rPr lang="en-US" dirty="0"/>
-              <a:t>entry</a:t>
+              <a:t>2: i2 = </a:t>
+            </a:r>
+            <a:r>
+              <a:rPr lang="en-US" dirty="0">
+                <a:sym typeface="Symbol" charset="2"/>
+              </a:rPr>
+              <a:t>(i1,i3)</a:t>
+            </a:r>
+            <a:endParaRPr lang="en-US" dirty="0"/>
+          </a:p>
+          <a:p>
+            <a:r>
+              <a:rPr lang="en-US" dirty="0"/>
+              <a:t>    k2 = </a:t>
+            </a:r>
+            <a:r>
+              <a:rPr lang="en-US" dirty="0">
+                <a:sym typeface="Symbol" charset="2"/>
+              </a:rPr>
+              <a:t>(k1,k3)</a:t>
+            </a:r>
+            <a:endParaRPr lang="en-US" dirty="0"/>
+          </a:p>
+          <a:p>
+            <a:r>
+              <a:rPr lang="en-US" dirty="0"/>
+              <a:t>    if i2 &lt; 100</a:t>
             </a:r>
             <a:endParaRPr lang="en-US" sz="2800" dirty="0"/>
           </a:p>
         </p:txBody>
       </p:sp>
-      <p:cxnSp>
-        <p:nvCxnSpPr>
-          <p:cNvPr id="8" name="Straight Arrow Connector 7"/>
-          <p:cNvCxnSpPr>
-            <a:stCxn id="6" idx="2"/>
-            <a:endCxn id="5" idx="0"/>
-          </p:cNvCxnSpPr>
-          <p:nvPr/>
-        </p:nvCxnSpPr>
-        <p:spPr bwMode="auto">
-          <a:xfrm flipH="1">
-            <a:off x="4208957" y="866329"/>
-            <a:ext cx="51489" cy="474439"/>
-          </a:xfrm>
-          <a:prstGeom prst="straightConnector1">
-            <a:avLst/>
-          </a:prstGeom>
-          <a:solidFill>
-            <a:schemeClr val="accent1"/>
-          </a:solidFill>
-          <a:ln w="9525" cap="flat" cmpd="sng" algn="ctr">
-            <a:solidFill>
-              <a:schemeClr val="tx1"/>
-            </a:solidFill>
-            <a:prstDash val="solid"/>
-            <a:round/>
-            <a:headEnd type="none" w="med" len="med"/>
-            <a:tailEnd type="arrow"/>
-          </a:ln>
-          <a:effectLst/>
-        </p:spPr>
-      </p:cxnSp>
-      <p:sp>
-        <p:nvSpPr>
-          <p:cNvPr id="10" name="Text Box 4"/>
+      <p:sp>
+        <p:nvSpPr>
+          <p:cNvPr id="222214" name="Text Box 6"/>
           <p:cNvSpPr txBox="1">
             <a:spLocks noChangeArrowheads="1"/>
           </p:cNvSpPr>
@@ -9212,8 +10066,8 @@
         </p:nvSpPr>
         <p:spPr bwMode="auto">
           <a:xfrm>
-            <a:off x="3131840" y="3140968"/>
-            <a:ext cx="2187768" cy="461665"/>
+            <a:off x="2506216" y="4797152"/>
+            <a:ext cx="1993776" cy="830997"/>
           </a:xfrm>
           <a:prstGeom prst="rect">
             <a:avLst/>
@@ -9232,7 +10086,7 @@
           <a:effectLst/>
         </p:spPr>
         <p:txBody>
-          <a:bodyPr wrap="none">
+          <a:bodyPr wrap="square">
             <a:prstTxWarp prst="textNoShape">
               <a:avLst/>
             </a:prstTxWarp>
@@ -9242,30 +10096,80 @@
           <a:p>
             <a:r>
               <a:rPr lang="en-US" dirty="0"/>
-              <a:t>2: if </a:t>
-            </a:r>
-            <a:r>
-              <a:rPr lang="en-US" dirty="0" err="1"/>
-              <a:t>i</a:t>
-            </a:r>
-            <a:r>
-              <a:rPr lang="en-US" dirty="0"/>
-              <a:t> &lt; k </a:t>
-            </a:r>
-            <a:r>
-              <a:rPr lang="en-US" dirty="0" err="1"/>
-              <a:t>goto</a:t>
-            </a:r>
-            <a:r>
-              <a:rPr lang="en-US" dirty="0"/>
-              <a:t> 3</a:t>
-            </a:r>
-          </a:p>
-        </p:txBody>
-      </p:sp>
-      <p:sp>
-        <p:nvSpPr>
-          <p:cNvPr id="11" name="Text Box 4"/>
+              <a:t>3: k3 := k2+1</a:t>
+            </a:r>
+          </a:p>
+          <a:p>
+            <a:r>
+              <a:rPr lang="en-US" dirty="0"/>
+              <a:t>    i3 := i2+1</a:t>
+            </a:r>
+          </a:p>
+        </p:txBody>
+      </p:sp>
+      <p:cxnSp>
+        <p:nvCxnSpPr>
+          <p:cNvPr id="222215" name="AutoShape 7"/>
+          <p:cNvCxnSpPr>
+            <a:cxnSpLocks noChangeShapeType="1"/>
+            <a:stCxn id="222212" idx="2"/>
+            <a:endCxn id="222213" idx="0"/>
+          </p:cNvCxnSpPr>
+          <p:nvPr/>
+        </p:nvCxnSpPr>
+        <p:spPr bwMode="auto">
+          <a:xfrm>
+            <a:off x="4147285" y="2742312"/>
+            <a:ext cx="403445" cy="326648"/>
+          </a:xfrm>
+          <a:prstGeom prst="straightConnector1">
+            <a:avLst/>
+          </a:prstGeom>
+          <a:noFill/>
+          <a:ln w="9525">
+            <a:solidFill>
+              <a:schemeClr val="tx1"/>
+            </a:solidFill>
+            <a:round/>
+            <a:headEnd/>
+            <a:tailEnd type="triangle" w="med" len="med"/>
+          </a:ln>
+          <a:effectLst/>
+        </p:spPr>
+      </p:cxnSp>
+      <p:cxnSp>
+        <p:nvCxnSpPr>
+          <p:cNvPr id="222216" name="AutoShape 8"/>
+          <p:cNvCxnSpPr>
+            <a:cxnSpLocks noChangeShapeType="1"/>
+            <a:stCxn id="222213" idx="2"/>
+            <a:endCxn id="222214" idx="0"/>
+          </p:cNvCxnSpPr>
+          <p:nvPr/>
+        </p:nvCxnSpPr>
+        <p:spPr bwMode="auto">
+          <a:xfrm flipH="1">
+            <a:off x="3503104" y="4269288"/>
+            <a:ext cx="1047626" cy="527864"/>
+          </a:xfrm>
+          <a:prstGeom prst="straightConnector1">
+            <a:avLst/>
+          </a:prstGeom>
+          <a:noFill/>
+          <a:ln w="9525">
+            <a:solidFill>
+              <a:schemeClr val="tx1"/>
+            </a:solidFill>
+            <a:round/>
+            <a:headEnd/>
+            <a:tailEnd type="triangle" w="med" len="med"/>
+          </a:ln>
+          <a:effectLst/>
+        </p:spPr>
+      </p:cxnSp>
+      <p:sp>
+        <p:nvSpPr>
+          <p:cNvPr id="222218" name="Text Box 10"/>
           <p:cNvSpPr txBox="1">
             <a:spLocks noChangeArrowheads="1"/>
           </p:cNvSpPr>
@@ -9273,8 +10177,8 @@
         </p:nvSpPr>
         <p:spPr bwMode="auto">
           <a:xfrm>
-            <a:off x="1835696" y="4149080"/>
-            <a:ext cx="1583336" cy="892552"/>
+            <a:off x="4716016" y="4797152"/>
+            <a:ext cx="1676400" cy="466725"/>
           </a:xfrm>
           <a:prstGeom prst="rect">
             <a:avLst/>
@@ -9293,7 +10197,7 @@
           <a:effectLst/>
         </p:spPr>
         <p:txBody>
-          <a:bodyPr wrap="none">
+          <a:bodyPr>
             <a:prstTxWarp prst="textNoShape">
               <a:avLst/>
             </a:prstTxWarp>
@@ -9303,531 +10207,79 @@
           <a:p>
             <a:r>
               <a:rPr lang="en-US" dirty="0"/>
-              <a:t>3: </a:t>
-            </a:r>
-            <a:r>
-              <a:rPr lang="en-US" dirty="0" err="1"/>
-              <a:t>i</a:t>
-            </a:r>
-            <a:r>
-              <a:rPr lang="en-US" dirty="0"/>
-              <a:t> := </a:t>
-            </a:r>
-            <a:r>
-              <a:rPr lang="en-US" dirty="0" err="1"/>
-              <a:t>i</a:t>
-            </a:r>
-            <a:r>
-              <a:rPr lang="en-US" dirty="0"/>
-              <a:t> + 1</a:t>
-            </a:r>
-          </a:p>
-          <a:p>
-            <a:r>
-              <a:rPr lang="en-US" sz="2800" dirty="0"/>
-              <a:t>   </a:t>
-            </a:r>
-            <a:r>
-              <a:rPr lang="en-US" dirty="0"/>
-              <a:t>j := j * 2</a:t>
-            </a:r>
-          </a:p>
-        </p:txBody>
-      </p:sp>
-      <p:sp>
-        <p:nvSpPr>
-          <p:cNvPr id="12" name="Text Box 4"/>
-          <p:cNvSpPr txBox="1">
-            <a:spLocks noChangeArrowheads="1"/>
-          </p:cNvSpPr>
-          <p:nvPr/>
-        </p:nvSpPr>
+              <a:t>4: return k</a:t>
+            </a:r>
+          </a:p>
+        </p:txBody>
+      </p:sp>
+      <p:cxnSp>
+        <p:nvCxnSpPr>
+          <p:cNvPr id="222222" name="AutoShape 14"/>
+          <p:cNvCxnSpPr>
+            <a:cxnSpLocks noChangeShapeType="1"/>
+            <a:stCxn id="222213" idx="2"/>
+            <a:endCxn id="222218" idx="0"/>
+          </p:cNvCxnSpPr>
+          <p:nvPr/>
+        </p:nvCxnSpPr>
         <p:spPr bwMode="auto">
           <a:xfrm>
-            <a:off x="4067944" y="5013176"/>
-            <a:ext cx="1244752" cy="461665"/>
-          </a:xfrm>
-          <a:prstGeom prst="rect">
-            <a:avLst/>
-          </a:prstGeom>
-          <a:solidFill>
-            <a:schemeClr val="accent1"/>
-          </a:solidFill>
+            <a:off x="4550730" y="4269288"/>
+            <a:ext cx="1003486" cy="527864"/>
+          </a:xfrm>
+          <a:prstGeom prst="straightConnector1">
+            <a:avLst/>
+          </a:prstGeom>
+          <a:noFill/>
           <a:ln w="9525">
             <a:solidFill>
               <a:schemeClr val="tx1"/>
             </a:solidFill>
-            <a:miter lim="800000"/>
+            <a:round/>
             <a:headEnd/>
-            <a:tailEnd/>
+            <a:tailEnd type="triangle" w="med" len="med"/>
           </a:ln>
           <a:effectLst/>
         </p:spPr>
-        <p:txBody>
-          <a:bodyPr wrap="none">
-            <a:prstTxWarp prst="textNoShape">
-              <a:avLst/>
-            </a:prstTxWarp>
-            <a:spAutoFit/>
-          </a:bodyPr>
-          <a:lstStyle/>
-          <a:p>
-            <a:r>
-              <a:rPr lang="en-US" dirty="0"/>
-              <a:t>5: print j</a:t>
-            </a:r>
-          </a:p>
-        </p:txBody>
-      </p:sp>
-      <p:sp>
-        <p:nvSpPr>
-          <p:cNvPr id="13" name="Text Box 4"/>
-          <p:cNvSpPr txBox="1">
-            <a:spLocks noChangeArrowheads="1"/>
-          </p:cNvSpPr>
-          <p:nvPr/>
-        </p:nvSpPr>
+      </p:cxnSp>
+      <p:cxnSp>
+        <p:nvCxnSpPr>
+          <p:cNvPr id="222227" name="AutoShape 19"/>
+          <p:cNvCxnSpPr>
+            <a:cxnSpLocks noChangeShapeType="1"/>
+            <a:stCxn id="222214" idx="2"/>
+            <a:endCxn id="222213" idx="0"/>
+          </p:cNvCxnSpPr>
+          <p:nvPr/>
+        </p:nvCxnSpPr>
         <p:spPr bwMode="auto">
-          <a:xfrm>
-            <a:off x="6372200" y="5013176"/>
-            <a:ext cx="1566354" cy="461665"/>
-          </a:xfrm>
-          <a:prstGeom prst="rect">
-            <a:avLst/>
-          </a:prstGeom>
-          <a:solidFill>
-            <a:schemeClr val="accent1"/>
-          </a:solidFill>
+          <a:xfrm rot="5400000" flipH="1" flipV="1">
+            <a:off x="2747322" y="3824742"/>
+            <a:ext cx="2559189" cy="1047626"/>
+          </a:xfrm>
+          <a:prstGeom prst="curvedConnector5">
+            <a:avLst>
+              <a:gd name="adj1" fmla="val -8933"/>
+              <a:gd name="adj2" fmla="val 334592"/>
+              <a:gd name="adj3" fmla="val 108933"/>
+            </a:avLst>
+          </a:prstGeom>
+          <a:noFill/>
           <a:ln w="9525">
             <a:solidFill>
               <a:schemeClr val="tx1"/>
             </a:solidFill>
-            <a:miter lim="800000"/>
+            <a:round/>
             <a:headEnd/>
-            <a:tailEnd/>
+            <a:tailEnd type="triangle" w="med" len="med"/>
           </a:ln>
           <a:effectLst/>
         </p:spPr>
-        <p:txBody>
-          <a:bodyPr wrap="none">
-            <a:prstTxWarp prst="textNoShape">
-              <a:avLst/>
-            </a:prstTxWarp>
-            <a:spAutoFit/>
-          </a:bodyPr>
-          <a:lstStyle/>
-          <a:p>
-            <a:r>
-              <a:rPr lang="en-US" dirty="0"/>
-              <a:t>6: </a:t>
-            </a:r>
-            <a:r>
-              <a:rPr lang="en-US" dirty="0" err="1"/>
-              <a:t>i</a:t>
-            </a:r>
-            <a:r>
-              <a:rPr lang="en-US" dirty="0"/>
-              <a:t> := </a:t>
-            </a:r>
-            <a:r>
-              <a:rPr lang="en-US" dirty="0" err="1"/>
-              <a:t>i</a:t>
-            </a:r>
-            <a:r>
-              <a:rPr lang="en-US" dirty="0"/>
-              <a:t> + 1</a:t>
-            </a:r>
-          </a:p>
-        </p:txBody>
-      </p:sp>
-      <p:cxnSp>
-        <p:nvCxnSpPr>
-          <p:cNvPr id="16" name="Straight Arrow Connector 15"/>
-          <p:cNvCxnSpPr>
-            <a:stCxn id="5" idx="2"/>
-            <a:endCxn id="10" idx="0"/>
-          </p:cNvCxnSpPr>
-          <p:nvPr/>
-        </p:nvCxnSpPr>
-        <p:spPr bwMode="auto">
-          <a:xfrm>
-            <a:off x="4208957" y="2602652"/>
-            <a:ext cx="16767" cy="538316"/>
-          </a:xfrm>
-          <a:prstGeom prst="straightConnector1">
-            <a:avLst/>
-          </a:prstGeom>
-          <a:solidFill>
-            <a:schemeClr val="accent1"/>
-          </a:solidFill>
-          <a:ln w="9525" cap="flat" cmpd="sng" algn="ctr">
-            <a:solidFill>
-              <a:schemeClr val="tx1"/>
-            </a:solidFill>
-            <a:prstDash val="solid"/>
-            <a:round/>
-            <a:headEnd type="none" w="med" len="med"/>
-            <a:tailEnd type="arrow"/>
-          </a:ln>
-          <a:effectLst/>
-        </p:spPr>
       </p:cxnSp>
-      <p:sp>
-        <p:nvSpPr>
-          <p:cNvPr id="17" name="Text Box 4"/>
-          <p:cNvSpPr txBox="1">
-            <a:spLocks noChangeArrowheads="1"/>
-          </p:cNvSpPr>
-          <p:nvPr/>
-        </p:nvSpPr>
-        <p:spPr bwMode="auto">
-          <a:xfrm>
-            <a:off x="4499992" y="4149080"/>
-            <a:ext cx="2649433" cy="461665"/>
-          </a:xfrm>
-          <a:prstGeom prst="rect">
-            <a:avLst/>
-          </a:prstGeom>
-          <a:solidFill>
-            <a:schemeClr val="accent1"/>
-          </a:solidFill>
-          <a:ln w="9525">
-            <a:solidFill>
-              <a:schemeClr val="tx1"/>
-            </a:solidFill>
-            <a:miter lim="800000"/>
-            <a:headEnd/>
-            <a:tailEnd/>
-          </a:ln>
-          <a:effectLst/>
-        </p:spPr>
-        <p:txBody>
-          <a:bodyPr wrap="none">
-            <a:prstTxWarp prst="textNoShape">
-              <a:avLst/>
-            </a:prstTxWarp>
-            <a:spAutoFit/>
-          </a:bodyPr>
-          <a:lstStyle/>
-          <a:p>
-            <a:r>
-              <a:rPr lang="en-US"/>
-              <a:t>4: </a:t>
-            </a:r>
-            <a:r>
-              <a:rPr lang="en-US" dirty="0"/>
-              <a:t>if j &gt; k*10 </a:t>
-            </a:r>
-            <a:r>
-              <a:rPr lang="en-US" dirty="0" err="1"/>
-              <a:t>goto</a:t>
-            </a:r>
-            <a:r>
-              <a:rPr lang="en-US" dirty="0"/>
-              <a:t> 5</a:t>
-            </a:r>
-          </a:p>
-        </p:txBody>
-      </p:sp>
-      <p:sp>
-        <p:nvSpPr>
-          <p:cNvPr id="19" name="Text Box 4"/>
-          <p:cNvSpPr txBox="1">
-            <a:spLocks noChangeArrowheads="1"/>
-          </p:cNvSpPr>
-          <p:nvPr/>
-        </p:nvSpPr>
-        <p:spPr bwMode="auto">
-          <a:xfrm>
-            <a:off x="5508104" y="5877272"/>
-            <a:ext cx="646331" cy="461665"/>
-          </a:xfrm>
-          <a:prstGeom prst="rect">
-            <a:avLst/>
-          </a:prstGeom>
-          <a:solidFill>
-            <a:schemeClr val="accent1"/>
-          </a:solidFill>
-          <a:ln w="9525">
-            <a:solidFill>
-              <a:schemeClr val="tx1"/>
-            </a:solidFill>
-            <a:miter lim="800000"/>
-            <a:headEnd/>
-            <a:tailEnd/>
-          </a:ln>
-          <a:effectLst/>
-        </p:spPr>
-        <p:txBody>
-          <a:bodyPr wrap="none">
-            <a:prstTxWarp prst="textNoShape">
-              <a:avLst/>
-            </a:prstTxWarp>
-            <a:spAutoFit/>
-          </a:bodyPr>
-          <a:lstStyle/>
-          <a:p>
-            <a:r>
-              <a:rPr lang="en-US" dirty="0"/>
-              <a:t>exit</a:t>
-            </a:r>
-            <a:endParaRPr lang="en-US" sz="2800" dirty="0"/>
-          </a:p>
-        </p:txBody>
-      </p:sp>
-      <p:cxnSp>
-        <p:nvCxnSpPr>
-          <p:cNvPr id="21" name="Straight Arrow Connector 20"/>
-          <p:cNvCxnSpPr>
-            <a:stCxn id="10" idx="2"/>
-          </p:cNvCxnSpPr>
-          <p:nvPr/>
-        </p:nvCxnSpPr>
-        <p:spPr bwMode="auto">
-          <a:xfrm flipH="1">
-            <a:off x="2915816" y="3602633"/>
-            <a:ext cx="1309908" cy="546447"/>
-          </a:xfrm>
-          <a:prstGeom prst="straightConnector1">
-            <a:avLst/>
-          </a:prstGeom>
-          <a:solidFill>
-            <a:schemeClr val="accent1"/>
-          </a:solidFill>
-          <a:ln w="9525" cap="flat" cmpd="sng" algn="ctr">
-            <a:solidFill>
-              <a:schemeClr val="tx1"/>
-            </a:solidFill>
-            <a:prstDash val="solid"/>
-            <a:round/>
-            <a:headEnd type="none" w="med" len="med"/>
-            <a:tailEnd type="arrow"/>
-          </a:ln>
-          <a:effectLst/>
-        </p:spPr>
-      </p:cxnSp>
-      <p:cxnSp>
-        <p:nvCxnSpPr>
-          <p:cNvPr id="23" name="Straight Arrow Connector 22"/>
-          <p:cNvCxnSpPr>
-            <a:stCxn id="10" idx="2"/>
-          </p:cNvCxnSpPr>
-          <p:nvPr/>
-        </p:nvCxnSpPr>
-        <p:spPr bwMode="auto">
-          <a:xfrm>
-            <a:off x="4225724" y="3602633"/>
-            <a:ext cx="1498404" cy="474439"/>
-          </a:xfrm>
-          <a:prstGeom prst="straightConnector1">
-            <a:avLst/>
-          </a:prstGeom>
-          <a:solidFill>
-            <a:schemeClr val="accent1"/>
-          </a:solidFill>
-          <a:ln w="9525" cap="flat" cmpd="sng" algn="ctr">
-            <a:solidFill>
-              <a:schemeClr val="tx1"/>
-            </a:solidFill>
-            <a:prstDash val="solid"/>
-            <a:round/>
-            <a:headEnd type="none" w="med" len="med"/>
-            <a:tailEnd type="arrow"/>
-          </a:ln>
-          <a:effectLst/>
-        </p:spPr>
-      </p:cxnSp>
-      <p:cxnSp>
-        <p:nvCxnSpPr>
-          <p:cNvPr id="25" name="Straight Arrow Connector 24"/>
-          <p:cNvCxnSpPr>
-            <a:stCxn id="17" idx="2"/>
-            <a:endCxn id="12" idx="0"/>
-          </p:cNvCxnSpPr>
-          <p:nvPr/>
-        </p:nvCxnSpPr>
-        <p:spPr bwMode="auto">
-          <a:xfrm flipH="1">
-            <a:off x="4690320" y="4610745"/>
-            <a:ext cx="1134389" cy="402431"/>
-          </a:xfrm>
-          <a:prstGeom prst="straightConnector1">
-            <a:avLst/>
-          </a:prstGeom>
-          <a:solidFill>
-            <a:schemeClr val="accent1"/>
-          </a:solidFill>
-          <a:ln w="9525" cap="flat" cmpd="sng" algn="ctr">
-            <a:solidFill>
-              <a:schemeClr val="tx1"/>
-            </a:solidFill>
-            <a:prstDash val="solid"/>
-            <a:round/>
-            <a:headEnd type="none" w="med" len="med"/>
-            <a:tailEnd type="arrow"/>
-          </a:ln>
-          <a:effectLst/>
-        </p:spPr>
-      </p:cxnSp>
-      <p:cxnSp>
-        <p:nvCxnSpPr>
-          <p:cNvPr id="27" name="Straight Arrow Connector 26"/>
-          <p:cNvCxnSpPr>
-            <a:stCxn id="17" idx="2"/>
-          </p:cNvCxnSpPr>
-          <p:nvPr/>
-        </p:nvCxnSpPr>
-        <p:spPr bwMode="auto">
-          <a:xfrm>
-            <a:off x="5824709" y="4610745"/>
-            <a:ext cx="1195563" cy="330423"/>
-          </a:xfrm>
-          <a:prstGeom prst="straightConnector1">
-            <a:avLst/>
-          </a:prstGeom>
-          <a:solidFill>
-            <a:schemeClr val="accent1"/>
-          </a:solidFill>
-          <a:ln w="9525" cap="flat" cmpd="sng" algn="ctr">
-            <a:solidFill>
-              <a:schemeClr val="tx1"/>
-            </a:solidFill>
-            <a:prstDash val="solid"/>
-            <a:round/>
-            <a:headEnd type="none" w="med" len="med"/>
-            <a:tailEnd type="arrow"/>
-          </a:ln>
-          <a:effectLst/>
-        </p:spPr>
-      </p:cxnSp>
-      <p:cxnSp>
-        <p:nvCxnSpPr>
-          <p:cNvPr id="29" name="Straight Arrow Connector 28"/>
-          <p:cNvCxnSpPr>
-            <a:stCxn id="12" idx="2"/>
-            <a:endCxn id="19" idx="0"/>
-          </p:cNvCxnSpPr>
-          <p:nvPr/>
-        </p:nvCxnSpPr>
-        <p:spPr bwMode="auto">
-          <a:xfrm>
-            <a:off x="4690320" y="5474841"/>
-            <a:ext cx="1140950" cy="402431"/>
-          </a:xfrm>
-          <a:prstGeom prst="straightConnector1">
-            <a:avLst/>
-          </a:prstGeom>
-          <a:solidFill>
-            <a:schemeClr val="accent1"/>
-          </a:solidFill>
-          <a:ln w="9525" cap="flat" cmpd="sng" algn="ctr">
-            <a:solidFill>
-              <a:schemeClr val="tx1"/>
-            </a:solidFill>
-            <a:prstDash val="solid"/>
-            <a:round/>
-            <a:headEnd type="none" w="med" len="med"/>
-            <a:tailEnd type="arrow"/>
-          </a:ln>
-          <a:effectLst/>
-        </p:spPr>
-      </p:cxnSp>
-      <p:cxnSp>
-        <p:nvCxnSpPr>
-          <p:cNvPr id="31" name="Straight Arrow Connector 30"/>
-          <p:cNvCxnSpPr>
-            <a:stCxn id="13" idx="2"/>
-            <a:endCxn id="19" idx="0"/>
-          </p:cNvCxnSpPr>
-          <p:nvPr/>
-        </p:nvCxnSpPr>
-        <p:spPr bwMode="auto">
-          <a:xfrm flipH="1">
-            <a:off x="5831270" y="5474841"/>
-            <a:ext cx="1324107" cy="402431"/>
-          </a:xfrm>
-          <a:prstGeom prst="straightConnector1">
-            <a:avLst/>
-          </a:prstGeom>
-          <a:solidFill>
-            <a:schemeClr val="accent1"/>
-          </a:solidFill>
-          <a:ln w="9525" cap="flat" cmpd="sng" algn="ctr">
-            <a:solidFill>
-              <a:schemeClr val="tx1"/>
-            </a:solidFill>
-            <a:prstDash val="solid"/>
-            <a:round/>
-            <a:headEnd type="none" w="med" len="med"/>
-            <a:tailEnd type="arrow"/>
-          </a:ln>
-          <a:effectLst/>
-        </p:spPr>
-      </p:cxnSp>
-      <p:cxnSp>
-        <p:nvCxnSpPr>
-          <p:cNvPr id="33" name="Curved Connector 32"/>
-          <p:cNvCxnSpPr>
-            <a:stCxn id="11" idx="2"/>
-            <a:endCxn id="10" idx="0"/>
-          </p:cNvCxnSpPr>
-          <p:nvPr/>
-        </p:nvCxnSpPr>
-        <p:spPr bwMode="auto">
-          <a:xfrm rot="5400000" flipH="1" flipV="1">
-            <a:off x="2476212" y="3292120"/>
-            <a:ext cx="1900664" cy="1598360"/>
-          </a:xfrm>
-          <a:prstGeom prst="curvedConnector5">
-            <a:avLst>
-              <a:gd name="adj1" fmla="val -12027"/>
-              <a:gd name="adj2" fmla="val -101317"/>
-              <a:gd name="adj3" fmla="val 112027"/>
-            </a:avLst>
-          </a:prstGeom>
-          <a:solidFill>
-            <a:schemeClr val="accent1"/>
-          </a:solidFill>
-          <a:ln w="9525" cap="flat" cmpd="sng" algn="ctr">
-            <a:solidFill>
-              <a:schemeClr val="tx1"/>
-            </a:solidFill>
-            <a:prstDash val="solid"/>
-            <a:round/>
-            <a:headEnd type="none" w="med" len="med"/>
-            <a:tailEnd type="arrow"/>
-          </a:ln>
-          <a:effectLst/>
-        </p:spPr>
-      </p:cxnSp>
-      <p:sp>
-        <p:nvSpPr>
-          <p:cNvPr id="2" name="Slide Number Placeholder 1"/>
-          <p:cNvSpPr>
-            <a:spLocks noGrp="1"/>
-          </p:cNvSpPr>
-          <p:nvPr>
-            <p:ph type="sldNum" sz="quarter" idx="11"/>
-          </p:nvPr>
-        </p:nvSpPr>
-        <p:spPr/>
-        <p:txBody>
-          <a:bodyPr/>
-          <a:lstStyle/>
-          <a:p>
-            <a:fld id="{C1F62FDB-F864-E842-91C2-6712A2A87806}" type="slidenum">
-              <a:rPr lang="en-US" smtClean="0"/>
-              <a:pPr/>
-              <a:t>14</a:t>
-            </a:fld>
-            <a:endParaRPr lang="en-US"/>
-          </a:p>
-        </p:txBody>
-      </p:sp>
     </p:spTree>
     <p:extLst>
       <p:ext uri="{BB962C8B-B14F-4D97-AF65-F5344CB8AC3E}">
-        <p14:creationId xmlns:p14="http://schemas.microsoft.com/office/powerpoint/2010/main" val="2014610699"/>
+        <p14:creationId xmlns:p14="http://schemas.microsoft.com/office/powerpoint/2010/main" val="3492114016"/>
       </p:ext>
     </p:extLst>
   </p:cSld>
@@ -9864,8 +10316,8 @@
         </p:nvSpPr>
         <p:spPr bwMode="auto">
           <a:xfrm>
-            <a:off x="3635896" y="1124744"/>
-            <a:ext cx="1529535" cy="1323439"/>
+            <a:off x="3563888" y="1340768"/>
+            <a:ext cx="1290137" cy="1261884"/>
           </a:xfrm>
           <a:prstGeom prst="rect">
             <a:avLst/>
@@ -9894,27 +10346,31 @@
           <a:p>
             <a:r>
               <a:rPr lang="en-US" dirty="0"/>
-              <a:t>1: k1 := 10</a:t>
+              <a:t>1: </a:t>
+            </a:r>
+            <a:r>
+              <a:rPr lang="en-US" dirty="0" err="1"/>
+              <a:t>i</a:t>
+            </a:r>
+            <a:r>
+              <a:rPr lang="en-US" dirty="0"/>
+              <a:t> := 1</a:t>
             </a:r>
           </a:p>
           <a:p>
             <a:r>
               <a:rPr lang="en-US" sz="2800" dirty="0"/>
-              <a:t>    </a:t>
-            </a:r>
-            <a:r>
-              <a:rPr lang="en-US" dirty="0"/>
-              <a:t>i1 := 1</a:t>
-            </a:r>
-          </a:p>
-          <a:p>
-            <a:r>
-              <a:rPr lang="en-US" sz="2800" dirty="0"/>
-              <a:t>    </a:t>
-            </a:r>
-            <a:r>
-              <a:rPr lang="en-US" dirty="0"/>
-              <a:t>j1 := 2</a:t>
+              <a:t>   </a:t>
+            </a:r>
+            <a:r>
+              <a:rPr lang="en-US" dirty="0"/>
+              <a:t>j := 2</a:t>
+            </a:r>
+          </a:p>
+          <a:p>
+            <a:r>
+              <a:rPr lang="en-US" dirty="0"/>
+              <a:t>   k := 10</a:t>
             </a:r>
           </a:p>
         </p:txBody>
@@ -9929,7 +10385,7 @@
         </p:nvSpPr>
         <p:spPr bwMode="auto">
           <a:xfrm>
-            <a:off x="3995936" y="332656"/>
+            <a:off x="3851920" y="404664"/>
             <a:ext cx="817051" cy="461665"/>
           </a:xfrm>
           <a:prstGeom prst="rect">
@@ -9976,8 +10432,8 @@
         </p:nvCxnSpPr>
         <p:spPr bwMode="auto">
           <a:xfrm flipH="1">
-            <a:off x="4400664" y="794321"/>
-            <a:ext cx="3798" cy="330423"/>
+            <a:off x="4208957" y="866329"/>
+            <a:ext cx="51489" cy="474439"/>
           </a:xfrm>
           <a:prstGeom prst="straightConnector1">
             <a:avLst/>
@@ -10007,8 +10463,8 @@
         </p:nvSpPr>
         <p:spPr bwMode="auto">
           <a:xfrm>
-            <a:off x="3059832" y="2924944"/>
-            <a:ext cx="2640867" cy="1200328"/>
+            <a:off x="3131840" y="3140968"/>
+            <a:ext cx="2187768" cy="461665"/>
           </a:xfrm>
           <a:prstGeom prst="rect">
             <a:avLst/>
@@ -10037,27 +10493,15 @@
           <a:p>
             <a:r>
               <a:rPr lang="en-US" dirty="0"/>
-              <a:t>2:   i2 := </a:t>
-            </a:r>
-            <a:r>
-              <a:rPr lang="en-US" dirty="0">
-                <a:sym typeface="Symbol" charset="2"/>
-              </a:rPr>
-              <a:t>(i1,i3)</a:t>
-            </a:r>
-          </a:p>
-          <a:p>
-            <a:r>
-              <a:rPr lang="en-US" dirty="0">
-                <a:sym typeface="Symbol" charset="2"/>
-              </a:rPr>
-              <a:t>      j2 := (j1,j3)</a:t>
-            </a:r>
-          </a:p>
-          <a:p>
-            <a:r>
-              <a:rPr lang="en-US" dirty="0"/>
-              <a:t>      if i2 &lt; k1 </a:t>
+              <a:t>2: if </a:t>
+            </a:r>
+            <a:r>
+              <a:rPr lang="en-US" dirty="0" err="1"/>
+              <a:t>i</a:t>
+            </a:r>
+            <a:r>
+              <a:rPr lang="en-US" dirty="0"/>
+              <a:t> &lt; k </a:t>
             </a:r>
             <a:r>
               <a:rPr lang="en-US" dirty="0" err="1"/>
@@ -10080,8 +10524,8 @@
         </p:nvSpPr>
         <p:spPr bwMode="auto">
           <a:xfrm>
-            <a:off x="1403648" y="4653136"/>
-            <a:ext cx="1874131" cy="892552"/>
+            <a:off x="1835696" y="4149080"/>
+            <a:ext cx="1583336" cy="892552"/>
           </a:xfrm>
           <a:prstGeom prst="rect">
             <a:avLst/>
@@ -10110,7 +10554,23 @@
           <a:p>
             <a:r>
               <a:rPr lang="en-US" dirty="0"/>
-              <a:t>3: i3 := i2 + 1</a:t>
+              <a:t>3: </a:t>
+            </a:r>
+            <a:r>
+              <a:rPr lang="en-US" dirty="0" err="1"/>
+              <a:t>i</a:t>
+            </a:r>
+            <a:r>
+              <a:rPr lang="en-US" dirty="0"/>
+              <a:t> := </a:t>
+            </a:r>
+            <a:r>
+              <a:rPr lang="en-US" dirty="0" err="1"/>
+              <a:t>i</a:t>
+            </a:r>
+            <a:r>
+              <a:rPr lang="en-US" dirty="0"/>
+              <a:t> + 1</a:t>
             </a:r>
           </a:p>
           <a:p>
@@ -10120,7 +10580,7 @@
             </a:r>
             <a:r>
               <a:rPr lang="en-US" dirty="0"/>
-              <a:t>j3 := j2 * 2</a:t>
+              <a:t>j := j * 2</a:t>
             </a:r>
           </a:p>
         </p:txBody>
@@ -10135,8 +10595,8 @@
         </p:nvSpPr>
         <p:spPr bwMode="auto">
           <a:xfrm>
-            <a:off x="4067944" y="5301208"/>
-            <a:ext cx="1398640" cy="461665"/>
+            <a:off x="4067944" y="5013176"/>
+            <a:ext cx="1244752" cy="461665"/>
           </a:xfrm>
           <a:prstGeom prst="rect">
             <a:avLst/>
@@ -10165,7 +10625,7 @@
           <a:p>
             <a:r>
               <a:rPr lang="en-US" dirty="0"/>
-              <a:t>5: print j2</a:t>
+              <a:t>5: print j</a:t>
             </a:r>
           </a:p>
         </p:txBody>
@@ -10180,8 +10640,8 @@
         </p:nvSpPr>
         <p:spPr bwMode="auto">
           <a:xfrm>
-            <a:off x="6372200" y="5301208"/>
-            <a:ext cx="1874131" cy="461665"/>
+            <a:off x="6372200" y="5013176"/>
+            <a:ext cx="1566354" cy="461665"/>
           </a:xfrm>
           <a:prstGeom prst="rect">
             <a:avLst/>
@@ -10210,7 +10670,23 @@
           <a:p>
             <a:r>
               <a:rPr lang="en-US" dirty="0"/>
-              <a:t>6: i4 := i2 + 1</a:t>
+              <a:t>6: </a:t>
+            </a:r>
+            <a:r>
+              <a:rPr lang="en-US" dirty="0" err="1"/>
+              <a:t>i</a:t>
+            </a:r>
+            <a:r>
+              <a:rPr lang="en-US" dirty="0"/>
+              <a:t> := </a:t>
+            </a:r>
+            <a:r>
+              <a:rPr lang="en-US" dirty="0" err="1"/>
+              <a:t>i</a:t>
+            </a:r>
+            <a:r>
+              <a:rPr lang="en-US" dirty="0"/>
+              <a:t> + 1</a:t>
             </a:r>
           </a:p>
         </p:txBody>
@@ -10225,9 +10701,9 @@
           <p:nvPr/>
         </p:nvCxnSpPr>
         <p:spPr bwMode="auto">
-          <a:xfrm flipH="1">
-            <a:off x="4380266" y="2448183"/>
-            <a:ext cx="20398" cy="476761"/>
+          <a:xfrm>
+            <a:off x="4208957" y="2602652"/>
+            <a:ext cx="16767" cy="538316"/>
           </a:xfrm>
           <a:prstGeom prst="straightConnector1">
             <a:avLst/>
@@ -10257,8 +10733,8 @@
         </p:nvSpPr>
         <p:spPr bwMode="auto">
           <a:xfrm>
-            <a:off x="4499992" y="4437112"/>
-            <a:ext cx="2957210" cy="461665"/>
+            <a:off x="4499992" y="4149080"/>
+            <a:ext cx="2649433" cy="461665"/>
           </a:xfrm>
           <a:prstGeom prst="rect">
             <a:avLst/>
@@ -10286,8 +10762,12 @@
           <a:lstStyle/>
           <a:p>
             <a:r>
-              <a:rPr lang="en-US" dirty="0"/>
-              <a:t>4: if j2 &gt; k1*10 </a:t>
+              <a:rPr lang="en-US"/>
+              <a:t>4: </a:t>
+            </a:r>
+            <a:r>
+              <a:rPr lang="en-US" dirty="0"/>
+              <a:t>if j &gt; k*10 </a:t>
             </a:r>
             <a:r>
               <a:rPr lang="en-US" dirty="0" err="1"/>
@@ -10310,7 +10790,7 @@
         </p:nvSpPr>
         <p:spPr bwMode="auto">
           <a:xfrm>
-            <a:off x="5508104" y="6165304"/>
+            <a:off x="5508104" y="5877272"/>
             <a:ext cx="646331" cy="461665"/>
           </a:xfrm>
           <a:prstGeom prst="rect">
@@ -10351,14 +10831,13 @@
           <p:cNvPr id="21" name="Straight Arrow Connector 20"/>
           <p:cNvCxnSpPr>
             <a:stCxn id="10" idx="2"/>
-            <a:endCxn id="11" idx="0"/>
           </p:cNvCxnSpPr>
           <p:nvPr/>
         </p:nvCxnSpPr>
         <p:spPr bwMode="auto">
           <a:xfrm flipH="1">
-            <a:off x="2340714" y="4125272"/>
-            <a:ext cx="2039552" cy="527864"/>
+            <a:off x="2915816" y="3602633"/>
+            <a:ext cx="1309908" cy="546447"/>
           </a:xfrm>
           <a:prstGeom prst="straightConnector1">
             <a:avLst/>
@@ -10388,8 +10867,8 @@
         </p:nvCxnSpPr>
         <p:spPr bwMode="auto">
           <a:xfrm>
-            <a:off x="4380266" y="4125272"/>
-            <a:ext cx="1271854" cy="239832"/>
+            <a:off x="4225724" y="3602633"/>
+            <a:ext cx="1498404" cy="474439"/>
           </a:xfrm>
           <a:prstGeom prst="straightConnector1">
             <a:avLst/>
@@ -10420,8 +10899,8 @@
         </p:nvCxnSpPr>
         <p:spPr bwMode="auto">
           <a:xfrm flipH="1">
-            <a:off x="4767264" y="4898777"/>
-            <a:ext cx="1211333" cy="402431"/>
+            <a:off x="4690320" y="4610745"/>
+            <a:ext cx="1134389" cy="402431"/>
           </a:xfrm>
           <a:prstGeom prst="straightConnector1">
             <a:avLst/>
@@ -10451,8 +10930,8 @@
         </p:nvCxnSpPr>
         <p:spPr bwMode="auto">
           <a:xfrm>
-            <a:off x="5978597" y="4898777"/>
-            <a:ext cx="1041675" cy="330423"/>
+            <a:off x="5824709" y="4610745"/>
+            <a:ext cx="1195563" cy="330423"/>
           </a:xfrm>
           <a:prstGeom prst="straightConnector1">
             <a:avLst/>
@@ -10483,8 +10962,8 @@
         </p:nvCxnSpPr>
         <p:spPr bwMode="auto">
           <a:xfrm>
-            <a:off x="4767264" y="5762873"/>
-            <a:ext cx="1064006" cy="402431"/>
+            <a:off x="4690320" y="5474841"/>
+            <a:ext cx="1140950" cy="402431"/>
           </a:xfrm>
           <a:prstGeom prst="straightConnector1">
             <a:avLst/>
@@ -10515,8 +10994,8 @@
         </p:nvCxnSpPr>
         <p:spPr bwMode="auto">
           <a:xfrm flipH="1">
-            <a:off x="5831270" y="5762873"/>
-            <a:ext cx="1477996" cy="402431"/>
+            <a:off x="5831270" y="5474841"/>
+            <a:ext cx="1324107" cy="402431"/>
           </a:xfrm>
           <a:prstGeom prst="straightConnector1">
             <a:avLst/>
@@ -10547,14 +11026,14 @@
         </p:nvCxnSpPr>
         <p:spPr bwMode="auto">
           <a:xfrm rot="5400000" flipH="1" flipV="1">
-            <a:off x="2050118" y="3215540"/>
-            <a:ext cx="2620744" cy="2039552"/>
+            <a:off x="2476212" y="3292120"/>
+            <a:ext cx="1900664" cy="1598360"/>
           </a:xfrm>
           <a:prstGeom prst="curvedConnector5">
             <a:avLst>
-              <a:gd name="adj1" fmla="val -8723"/>
-              <a:gd name="adj2" fmla="val -83243"/>
-              <a:gd name="adj3" fmla="val 108723"/>
+              <a:gd name="adj1" fmla="val -12027"/>
+              <a:gd name="adj2" fmla="val -101317"/>
+              <a:gd name="adj3" fmla="val 112027"/>
             </a:avLst>
           </a:prstGeom>
           <a:solidFill>
@@ -10591,6 +11070,778 @@
               <a:rPr lang="en-US" smtClean="0"/>
               <a:pPr/>
               <a:t>15</a:t>
+            </a:fld>
+            <a:endParaRPr lang="en-US"/>
+          </a:p>
+        </p:txBody>
+      </p:sp>
+    </p:spTree>
+    <p:extLst>
+      <p:ext uri="{BB962C8B-B14F-4D97-AF65-F5344CB8AC3E}">
+        <p14:creationId xmlns:p14="http://schemas.microsoft.com/office/powerpoint/2010/main" val="2014610699"/>
+      </p:ext>
+    </p:extLst>
+  </p:cSld>
+  <p:clrMapOvr>
+    <a:masterClrMapping/>
+  </p:clrMapOvr>
+</p:sld>
+</file>
+
+<file path=ppt/slides/slide16.xml><?xml version="1.0" encoding="utf-8"?>
+<p:sld xmlns:a="http://schemas.openxmlformats.org/drawingml/2006/main" xmlns:r="http://schemas.openxmlformats.org/officeDocument/2006/relationships" xmlns:p="http://schemas.openxmlformats.org/presentationml/2006/main">
+  <p:cSld>
+    <p:spTree>
+      <p:nvGrpSpPr>
+        <p:cNvPr id="1" name=""/>
+        <p:cNvGrpSpPr/>
+        <p:nvPr/>
+      </p:nvGrpSpPr>
+      <p:grpSpPr>
+        <a:xfrm>
+          <a:off x="0" y="0"/>
+          <a:ext cx="0" cy="0"/>
+          <a:chOff x="0" y="0"/>
+          <a:chExt cx="0" cy="0"/>
+        </a:xfrm>
+      </p:grpSpPr>
+      <p:sp>
+        <p:nvSpPr>
+          <p:cNvPr id="5" name="Text Box 4"/>
+          <p:cNvSpPr txBox="1">
+            <a:spLocks noChangeArrowheads="1"/>
+          </p:cNvSpPr>
+          <p:nvPr/>
+        </p:nvSpPr>
+        <p:spPr bwMode="auto">
+          <a:xfrm>
+            <a:off x="3635896" y="1124744"/>
+            <a:ext cx="1529535" cy="1323439"/>
+          </a:xfrm>
+          <a:prstGeom prst="rect">
+            <a:avLst/>
+          </a:prstGeom>
+          <a:solidFill>
+            <a:schemeClr val="accent1"/>
+          </a:solidFill>
+          <a:ln w="9525">
+            <a:solidFill>
+              <a:schemeClr val="tx1"/>
+            </a:solidFill>
+            <a:miter lim="800000"/>
+            <a:headEnd/>
+            <a:tailEnd/>
+          </a:ln>
+          <a:effectLst/>
+        </p:spPr>
+        <p:txBody>
+          <a:bodyPr wrap="none">
+            <a:prstTxWarp prst="textNoShape">
+              <a:avLst/>
+            </a:prstTxWarp>
+            <a:spAutoFit/>
+          </a:bodyPr>
+          <a:lstStyle/>
+          <a:p>
+            <a:r>
+              <a:rPr lang="en-US" dirty="0"/>
+              <a:t>1: k1 := 10</a:t>
+            </a:r>
+          </a:p>
+          <a:p>
+            <a:r>
+              <a:rPr lang="en-US" sz="2800" dirty="0"/>
+              <a:t>    </a:t>
+            </a:r>
+            <a:r>
+              <a:rPr lang="en-US" dirty="0"/>
+              <a:t>i1 := 1</a:t>
+            </a:r>
+          </a:p>
+          <a:p>
+            <a:r>
+              <a:rPr lang="en-US" sz="2800" dirty="0"/>
+              <a:t>    </a:t>
+            </a:r>
+            <a:r>
+              <a:rPr lang="en-US" dirty="0"/>
+              <a:t>j1 := 2</a:t>
+            </a:r>
+          </a:p>
+        </p:txBody>
+      </p:sp>
+      <p:sp>
+        <p:nvSpPr>
+          <p:cNvPr id="6" name="Text Box 4"/>
+          <p:cNvSpPr txBox="1">
+            <a:spLocks noChangeArrowheads="1"/>
+          </p:cNvSpPr>
+          <p:nvPr/>
+        </p:nvSpPr>
+        <p:spPr bwMode="auto">
+          <a:xfrm>
+            <a:off x="3995936" y="332656"/>
+            <a:ext cx="817051" cy="461665"/>
+          </a:xfrm>
+          <a:prstGeom prst="rect">
+            <a:avLst/>
+          </a:prstGeom>
+          <a:solidFill>
+            <a:schemeClr val="accent1"/>
+          </a:solidFill>
+          <a:ln w="9525">
+            <a:solidFill>
+              <a:schemeClr val="tx1"/>
+            </a:solidFill>
+            <a:miter lim="800000"/>
+            <a:headEnd/>
+            <a:tailEnd/>
+          </a:ln>
+          <a:effectLst/>
+        </p:spPr>
+        <p:txBody>
+          <a:bodyPr wrap="none">
+            <a:prstTxWarp prst="textNoShape">
+              <a:avLst/>
+            </a:prstTxWarp>
+            <a:spAutoFit/>
+          </a:bodyPr>
+          <a:lstStyle/>
+          <a:p>
+            <a:r>
+              <a:rPr lang="en-US" dirty="0"/>
+              <a:t>entry</a:t>
+            </a:r>
+            <a:endParaRPr lang="en-US" sz="2800" dirty="0"/>
+          </a:p>
+        </p:txBody>
+      </p:sp>
+      <p:cxnSp>
+        <p:nvCxnSpPr>
+          <p:cNvPr id="8" name="Straight Arrow Connector 7"/>
+          <p:cNvCxnSpPr>
+            <a:stCxn id="6" idx="2"/>
+            <a:endCxn id="5" idx="0"/>
+          </p:cNvCxnSpPr>
+          <p:nvPr/>
+        </p:nvCxnSpPr>
+        <p:spPr bwMode="auto">
+          <a:xfrm flipH="1">
+            <a:off x="4400664" y="794321"/>
+            <a:ext cx="3798" cy="330423"/>
+          </a:xfrm>
+          <a:prstGeom prst="straightConnector1">
+            <a:avLst/>
+          </a:prstGeom>
+          <a:solidFill>
+            <a:schemeClr val="accent1"/>
+          </a:solidFill>
+          <a:ln w="9525" cap="flat" cmpd="sng" algn="ctr">
+            <a:solidFill>
+              <a:schemeClr val="tx1"/>
+            </a:solidFill>
+            <a:prstDash val="solid"/>
+            <a:round/>
+            <a:headEnd type="none" w="med" len="med"/>
+            <a:tailEnd type="arrow"/>
+          </a:ln>
+          <a:effectLst/>
+        </p:spPr>
+      </p:cxnSp>
+      <p:sp>
+        <p:nvSpPr>
+          <p:cNvPr id="10" name="Text Box 4"/>
+          <p:cNvSpPr txBox="1">
+            <a:spLocks noChangeArrowheads="1"/>
+          </p:cNvSpPr>
+          <p:nvPr/>
+        </p:nvSpPr>
+        <p:spPr bwMode="auto">
+          <a:xfrm>
+            <a:off x="3059832" y="2924944"/>
+            <a:ext cx="2640867" cy="1200328"/>
+          </a:xfrm>
+          <a:prstGeom prst="rect">
+            <a:avLst/>
+          </a:prstGeom>
+          <a:solidFill>
+            <a:schemeClr val="accent1"/>
+          </a:solidFill>
+          <a:ln w="9525">
+            <a:solidFill>
+              <a:schemeClr val="tx1"/>
+            </a:solidFill>
+            <a:miter lim="800000"/>
+            <a:headEnd/>
+            <a:tailEnd/>
+          </a:ln>
+          <a:effectLst/>
+        </p:spPr>
+        <p:txBody>
+          <a:bodyPr wrap="none">
+            <a:prstTxWarp prst="textNoShape">
+              <a:avLst/>
+            </a:prstTxWarp>
+            <a:spAutoFit/>
+          </a:bodyPr>
+          <a:lstStyle/>
+          <a:p>
+            <a:r>
+              <a:rPr lang="en-US" dirty="0"/>
+              <a:t>2:   i2 := </a:t>
+            </a:r>
+            <a:r>
+              <a:rPr lang="en-US" dirty="0">
+                <a:sym typeface="Symbol" charset="2"/>
+              </a:rPr>
+              <a:t>(i1,i3)</a:t>
+            </a:r>
+          </a:p>
+          <a:p>
+            <a:r>
+              <a:rPr lang="en-US" dirty="0">
+                <a:sym typeface="Symbol" charset="2"/>
+              </a:rPr>
+              <a:t>      j2 := (j1,j3)</a:t>
+            </a:r>
+          </a:p>
+          <a:p>
+            <a:r>
+              <a:rPr lang="en-US" dirty="0"/>
+              <a:t>      if i2 &lt; k1 </a:t>
+            </a:r>
+            <a:r>
+              <a:rPr lang="en-US" dirty="0" err="1"/>
+              <a:t>goto</a:t>
+            </a:r>
+            <a:r>
+              <a:rPr lang="en-US" dirty="0"/>
+              <a:t> 3</a:t>
+            </a:r>
+          </a:p>
+        </p:txBody>
+      </p:sp>
+      <p:sp>
+        <p:nvSpPr>
+          <p:cNvPr id="11" name="Text Box 4"/>
+          <p:cNvSpPr txBox="1">
+            <a:spLocks noChangeArrowheads="1"/>
+          </p:cNvSpPr>
+          <p:nvPr/>
+        </p:nvSpPr>
+        <p:spPr bwMode="auto">
+          <a:xfrm>
+            <a:off x="1403648" y="4653136"/>
+            <a:ext cx="1874131" cy="892552"/>
+          </a:xfrm>
+          <a:prstGeom prst="rect">
+            <a:avLst/>
+          </a:prstGeom>
+          <a:solidFill>
+            <a:schemeClr val="accent1"/>
+          </a:solidFill>
+          <a:ln w="9525">
+            <a:solidFill>
+              <a:schemeClr val="tx1"/>
+            </a:solidFill>
+            <a:miter lim="800000"/>
+            <a:headEnd/>
+            <a:tailEnd/>
+          </a:ln>
+          <a:effectLst/>
+        </p:spPr>
+        <p:txBody>
+          <a:bodyPr wrap="none">
+            <a:prstTxWarp prst="textNoShape">
+              <a:avLst/>
+            </a:prstTxWarp>
+            <a:spAutoFit/>
+          </a:bodyPr>
+          <a:lstStyle/>
+          <a:p>
+            <a:r>
+              <a:rPr lang="en-US" dirty="0"/>
+              <a:t>3: i3 := i2 + 1</a:t>
+            </a:r>
+          </a:p>
+          <a:p>
+            <a:r>
+              <a:rPr lang="en-US" sz="2800" dirty="0"/>
+              <a:t>   </a:t>
+            </a:r>
+            <a:r>
+              <a:rPr lang="en-US" dirty="0"/>
+              <a:t>j3 := j2 * 2</a:t>
+            </a:r>
+          </a:p>
+        </p:txBody>
+      </p:sp>
+      <p:sp>
+        <p:nvSpPr>
+          <p:cNvPr id="12" name="Text Box 4"/>
+          <p:cNvSpPr txBox="1">
+            <a:spLocks noChangeArrowheads="1"/>
+          </p:cNvSpPr>
+          <p:nvPr/>
+        </p:nvSpPr>
+        <p:spPr bwMode="auto">
+          <a:xfrm>
+            <a:off x="4067944" y="5301208"/>
+            <a:ext cx="1398640" cy="461665"/>
+          </a:xfrm>
+          <a:prstGeom prst="rect">
+            <a:avLst/>
+          </a:prstGeom>
+          <a:solidFill>
+            <a:schemeClr val="accent1"/>
+          </a:solidFill>
+          <a:ln w="9525">
+            <a:solidFill>
+              <a:schemeClr val="tx1"/>
+            </a:solidFill>
+            <a:miter lim="800000"/>
+            <a:headEnd/>
+            <a:tailEnd/>
+          </a:ln>
+          <a:effectLst/>
+        </p:spPr>
+        <p:txBody>
+          <a:bodyPr wrap="none">
+            <a:prstTxWarp prst="textNoShape">
+              <a:avLst/>
+            </a:prstTxWarp>
+            <a:spAutoFit/>
+          </a:bodyPr>
+          <a:lstStyle/>
+          <a:p>
+            <a:r>
+              <a:rPr lang="en-US" dirty="0"/>
+              <a:t>5: print j2</a:t>
+            </a:r>
+          </a:p>
+        </p:txBody>
+      </p:sp>
+      <p:sp>
+        <p:nvSpPr>
+          <p:cNvPr id="13" name="Text Box 4"/>
+          <p:cNvSpPr txBox="1">
+            <a:spLocks noChangeArrowheads="1"/>
+          </p:cNvSpPr>
+          <p:nvPr/>
+        </p:nvSpPr>
+        <p:spPr bwMode="auto">
+          <a:xfrm>
+            <a:off x="6372200" y="5301208"/>
+            <a:ext cx="1874131" cy="461665"/>
+          </a:xfrm>
+          <a:prstGeom prst="rect">
+            <a:avLst/>
+          </a:prstGeom>
+          <a:solidFill>
+            <a:schemeClr val="accent1"/>
+          </a:solidFill>
+          <a:ln w="9525">
+            <a:solidFill>
+              <a:schemeClr val="tx1"/>
+            </a:solidFill>
+            <a:miter lim="800000"/>
+            <a:headEnd/>
+            <a:tailEnd/>
+          </a:ln>
+          <a:effectLst/>
+        </p:spPr>
+        <p:txBody>
+          <a:bodyPr wrap="none">
+            <a:prstTxWarp prst="textNoShape">
+              <a:avLst/>
+            </a:prstTxWarp>
+            <a:spAutoFit/>
+          </a:bodyPr>
+          <a:lstStyle/>
+          <a:p>
+            <a:r>
+              <a:rPr lang="en-US" dirty="0"/>
+              <a:t>6: i4 := i2 + 1</a:t>
+            </a:r>
+          </a:p>
+        </p:txBody>
+      </p:sp>
+      <p:cxnSp>
+        <p:nvCxnSpPr>
+          <p:cNvPr id="16" name="Straight Arrow Connector 15"/>
+          <p:cNvCxnSpPr>
+            <a:stCxn id="5" idx="2"/>
+            <a:endCxn id="10" idx="0"/>
+          </p:cNvCxnSpPr>
+          <p:nvPr/>
+        </p:nvCxnSpPr>
+        <p:spPr bwMode="auto">
+          <a:xfrm flipH="1">
+            <a:off x="4380266" y="2448183"/>
+            <a:ext cx="20398" cy="476761"/>
+          </a:xfrm>
+          <a:prstGeom prst="straightConnector1">
+            <a:avLst/>
+          </a:prstGeom>
+          <a:solidFill>
+            <a:schemeClr val="accent1"/>
+          </a:solidFill>
+          <a:ln w="9525" cap="flat" cmpd="sng" algn="ctr">
+            <a:solidFill>
+              <a:schemeClr val="tx1"/>
+            </a:solidFill>
+            <a:prstDash val="solid"/>
+            <a:round/>
+            <a:headEnd type="none" w="med" len="med"/>
+            <a:tailEnd type="arrow"/>
+          </a:ln>
+          <a:effectLst/>
+        </p:spPr>
+      </p:cxnSp>
+      <p:sp>
+        <p:nvSpPr>
+          <p:cNvPr id="17" name="Text Box 4"/>
+          <p:cNvSpPr txBox="1">
+            <a:spLocks noChangeArrowheads="1"/>
+          </p:cNvSpPr>
+          <p:nvPr/>
+        </p:nvSpPr>
+        <p:spPr bwMode="auto">
+          <a:xfrm>
+            <a:off x="4499992" y="4437112"/>
+            <a:ext cx="2957210" cy="461665"/>
+          </a:xfrm>
+          <a:prstGeom prst="rect">
+            <a:avLst/>
+          </a:prstGeom>
+          <a:solidFill>
+            <a:schemeClr val="accent1"/>
+          </a:solidFill>
+          <a:ln w="9525">
+            <a:solidFill>
+              <a:schemeClr val="tx1"/>
+            </a:solidFill>
+            <a:miter lim="800000"/>
+            <a:headEnd/>
+            <a:tailEnd/>
+          </a:ln>
+          <a:effectLst/>
+        </p:spPr>
+        <p:txBody>
+          <a:bodyPr wrap="none">
+            <a:prstTxWarp prst="textNoShape">
+              <a:avLst/>
+            </a:prstTxWarp>
+            <a:spAutoFit/>
+          </a:bodyPr>
+          <a:lstStyle/>
+          <a:p>
+            <a:r>
+              <a:rPr lang="en-US" dirty="0"/>
+              <a:t>4: if j2 &gt; k1*10 </a:t>
+            </a:r>
+            <a:r>
+              <a:rPr lang="en-US" dirty="0" err="1"/>
+              <a:t>goto</a:t>
+            </a:r>
+            <a:r>
+              <a:rPr lang="en-US" dirty="0"/>
+              <a:t> 5</a:t>
+            </a:r>
+          </a:p>
+        </p:txBody>
+      </p:sp>
+      <p:sp>
+        <p:nvSpPr>
+          <p:cNvPr id="19" name="Text Box 4"/>
+          <p:cNvSpPr txBox="1">
+            <a:spLocks noChangeArrowheads="1"/>
+          </p:cNvSpPr>
+          <p:nvPr/>
+        </p:nvSpPr>
+        <p:spPr bwMode="auto">
+          <a:xfrm>
+            <a:off x="5508104" y="6165304"/>
+            <a:ext cx="646331" cy="461665"/>
+          </a:xfrm>
+          <a:prstGeom prst="rect">
+            <a:avLst/>
+          </a:prstGeom>
+          <a:solidFill>
+            <a:schemeClr val="accent1"/>
+          </a:solidFill>
+          <a:ln w="9525">
+            <a:solidFill>
+              <a:schemeClr val="tx1"/>
+            </a:solidFill>
+            <a:miter lim="800000"/>
+            <a:headEnd/>
+            <a:tailEnd/>
+          </a:ln>
+          <a:effectLst/>
+        </p:spPr>
+        <p:txBody>
+          <a:bodyPr wrap="none">
+            <a:prstTxWarp prst="textNoShape">
+              <a:avLst/>
+            </a:prstTxWarp>
+            <a:spAutoFit/>
+          </a:bodyPr>
+          <a:lstStyle/>
+          <a:p>
+            <a:r>
+              <a:rPr lang="en-US" dirty="0"/>
+              <a:t>exit</a:t>
+            </a:r>
+            <a:endParaRPr lang="en-US" sz="2800" dirty="0"/>
+          </a:p>
+        </p:txBody>
+      </p:sp>
+      <p:cxnSp>
+        <p:nvCxnSpPr>
+          <p:cNvPr id="21" name="Straight Arrow Connector 20"/>
+          <p:cNvCxnSpPr>
+            <a:stCxn id="10" idx="2"/>
+            <a:endCxn id="11" idx="0"/>
+          </p:cNvCxnSpPr>
+          <p:nvPr/>
+        </p:nvCxnSpPr>
+        <p:spPr bwMode="auto">
+          <a:xfrm flipH="1">
+            <a:off x="2340714" y="4125272"/>
+            <a:ext cx="2039552" cy="527864"/>
+          </a:xfrm>
+          <a:prstGeom prst="straightConnector1">
+            <a:avLst/>
+          </a:prstGeom>
+          <a:solidFill>
+            <a:schemeClr val="accent1"/>
+          </a:solidFill>
+          <a:ln w="9525" cap="flat" cmpd="sng" algn="ctr">
+            <a:solidFill>
+              <a:schemeClr val="tx1"/>
+            </a:solidFill>
+            <a:prstDash val="solid"/>
+            <a:round/>
+            <a:headEnd type="none" w="med" len="med"/>
+            <a:tailEnd type="arrow"/>
+          </a:ln>
+          <a:effectLst/>
+        </p:spPr>
+      </p:cxnSp>
+      <p:cxnSp>
+        <p:nvCxnSpPr>
+          <p:cNvPr id="23" name="Straight Arrow Connector 22"/>
+          <p:cNvCxnSpPr>
+            <a:stCxn id="10" idx="2"/>
+          </p:cNvCxnSpPr>
+          <p:nvPr/>
+        </p:nvCxnSpPr>
+        <p:spPr bwMode="auto">
+          <a:xfrm>
+            <a:off x="4380266" y="4125272"/>
+            <a:ext cx="1271854" cy="239832"/>
+          </a:xfrm>
+          <a:prstGeom prst="straightConnector1">
+            <a:avLst/>
+          </a:prstGeom>
+          <a:solidFill>
+            <a:schemeClr val="accent1"/>
+          </a:solidFill>
+          <a:ln w="9525" cap="flat" cmpd="sng" algn="ctr">
+            <a:solidFill>
+              <a:schemeClr val="tx1"/>
+            </a:solidFill>
+            <a:prstDash val="solid"/>
+            <a:round/>
+            <a:headEnd type="none" w="med" len="med"/>
+            <a:tailEnd type="arrow"/>
+          </a:ln>
+          <a:effectLst/>
+        </p:spPr>
+      </p:cxnSp>
+      <p:cxnSp>
+        <p:nvCxnSpPr>
+          <p:cNvPr id="25" name="Straight Arrow Connector 24"/>
+          <p:cNvCxnSpPr>
+            <a:stCxn id="17" idx="2"/>
+            <a:endCxn id="12" idx="0"/>
+          </p:cNvCxnSpPr>
+          <p:nvPr/>
+        </p:nvCxnSpPr>
+        <p:spPr bwMode="auto">
+          <a:xfrm flipH="1">
+            <a:off x="4767264" y="4898777"/>
+            <a:ext cx="1211333" cy="402431"/>
+          </a:xfrm>
+          <a:prstGeom prst="straightConnector1">
+            <a:avLst/>
+          </a:prstGeom>
+          <a:solidFill>
+            <a:schemeClr val="accent1"/>
+          </a:solidFill>
+          <a:ln w="9525" cap="flat" cmpd="sng" algn="ctr">
+            <a:solidFill>
+              <a:schemeClr val="tx1"/>
+            </a:solidFill>
+            <a:prstDash val="solid"/>
+            <a:round/>
+            <a:headEnd type="none" w="med" len="med"/>
+            <a:tailEnd type="arrow"/>
+          </a:ln>
+          <a:effectLst/>
+        </p:spPr>
+      </p:cxnSp>
+      <p:cxnSp>
+        <p:nvCxnSpPr>
+          <p:cNvPr id="27" name="Straight Arrow Connector 26"/>
+          <p:cNvCxnSpPr>
+            <a:stCxn id="17" idx="2"/>
+          </p:cNvCxnSpPr>
+          <p:nvPr/>
+        </p:nvCxnSpPr>
+        <p:spPr bwMode="auto">
+          <a:xfrm>
+            <a:off x="5978597" y="4898777"/>
+            <a:ext cx="1041675" cy="330423"/>
+          </a:xfrm>
+          <a:prstGeom prst="straightConnector1">
+            <a:avLst/>
+          </a:prstGeom>
+          <a:solidFill>
+            <a:schemeClr val="accent1"/>
+          </a:solidFill>
+          <a:ln w="9525" cap="flat" cmpd="sng" algn="ctr">
+            <a:solidFill>
+              <a:schemeClr val="tx1"/>
+            </a:solidFill>
+            <a:prstDash val="solid"/>
+            <a:round/>
+            <a:headEnd type="none" w="med" len="med"/>
+            <a:tailEnd type="arrow"/>
+          </a:ln>
+          <a:effectLst/>
+        </p:spPr>
+      </p:cxnSp>
+      <p:cxnSp>
+        <p:nvCxnSpPr>
+          <p:cNvPr id="29" name="Straight Arrow Connector 28"/>
+          <p:cNvCxnSpPr>
+            <a:stCxn id="12" idx="2"/>
+            <a:endCxn id="19" idx="0"/>
+          </p:cNvCxnSpPr>
+          <p:nvPr/>
+        </p:nvCxnSpPr>
+        <p:spPr bwMode="auto">
+          <a:xfrm>
+            <a:off x="4767264" y="5762873"/>
+            <a:ext cx="1064006" cy="402431"/>
+          </a:xfrm>
+          <a:prstGeom prst="straightConnector1">
+            <a:avLst/>
+          </a:prstGeom>
+          <a:solidFill>
+            <a:schemeClr val="accent1"/>
+          </a:solidFill>
+          <a:ln w="9525" cap="flat" cmpd="sng" algn="ctr">
+            <a:solidFill>
+              <a:schemeClr val="tx1"/>
+            </a:solidFill>
+            <a:prstDash val="solid"/>
+            <a:round/>
+            <a:headEnd type="none" w="med" len="med"/>
+            <a:tailEnd type="arrow"/>
+          </a:ln>
+          <a:effectLst/>
+        </p:spPr>
+      </p:cxnSp>
+      <p:cxnSp>
+        <p:nvCxnSpPr>
+          <p:cNvPr id="31" name="Straight Arrow Connector 30"/>
+          <p:cNvCxnSpPr>
+            <a:stCxn id="13" idx="2"/>
+            <a:endCxn id="19" idx="0"/>
+          </p:cNvCxnSpPr>
+          <p:nvPr/>
+        </p:nvCxnSpPr>
+        <p:spPr bwMode="auto">
+          <a:xfrm flipH="1">
+            <a:off x="5831270" y="5762873"/>
+            <a:ext cx="1477996" cy="402431"/>
+          </a:xfrm>
+          <a:prstGeom prst="straightConnector1">
+            <a:avLst/>
+          </a:prstGeom>
+          <a:solidFill>
+            <a:schemeClr val="accent1"/>
+          </a:solidFill>
+          <a:ln w="9525" cap="flat" cmpd="sng" algn="ctr">
+            <a:solidFill>
+              <a:schemeClr val="tx1"/>
+            </a:solidFill>
+            <a:prstDash val="solid"/>
+            <a:round/>
+            <a:headEnd type="none" w="med" len="med"/>
+            <a:tailEnd type="arrow"/>
+          </a:ln>
+          <a:effectLst/>
+        </p:spPr>
+      </p:cxnSp>
+      <p:cxnSp>
+        <p:nvCxnSpPr>
+          <p:cNvPr id="33" name="Curved Connector 32"/>
+          <p:cNvCxnSpPr>
+            <a:stCxn id="11" idx="2"/>
+            <a:endCxn id="10" idx="0"/>
+          </p:cNvCxnSpPr>
+          <p:nvPr/>
+        </p:nvCxnSpPr>
+        <p:spPr bwMode="auto">
+          <a:xfrm rot="5400000" flipH="1" flipV="1">
+            <a:off x="2050118" y="3215540"/>
+            <a:ext cx="2620744" cy="2039552"/>
+          </a:xfrm>
+          <a:prstGeom prst="curvedConnector5">
+            <a:avLst>
+              <a:gd name="adj1" fmla="val -8723"/>
+              <a:gd name="adj2" fmla="val -83243"/>
+              <a:gd name="adj3" fmla="val 108723"/>
+            </a:avLst>
+          </a:prstGeom>
+          <a:solidFill>
+            <a:schemeClr val="accent1"/>
+          </a:solidFill>
+          <a:ln w="9525" cap="flat" cmpd="sng" algn="ctr">
+            <a:solidFill>
+              <a:schemeClr val="tx1"/>
+            </a:solidFill>
+            <a:prstDash val="solid"/>
+            <a:round/>
+            <a:headEnd type="none" w="med" len="med"/>
+            <a:tailEnd type="arrow"/>
+          </a:ln>
+          <a:effectLst/>
+        </p:spPr>
+      </p:cxnSp>
+      <p:sp>
+        <p:nvSpPr>
+          <p:cNvPr id="2" name="Slide Number Placeholder 1"/>
+          <p:cNvSpPr>
+            <a:spLocks noGrp="1"/>
+          </p:cNvSpPr>
+          <p:nvPr>
+            <p:ph type="sldNum" sz="quarter" idx="11"/>
+          </p:nvPr>
+        </p:nvSpPr>
+        <p:spPr/>
+        <p:txBody>
+          <a:bodyPr/>
+          <a:lstStyle/>
+          <a:p>
+            <a:fld id="{C1F62FDB-F864-E842-91C2-6712A2A87806}" type="slidenum">
+              <a:rPr lang="en-US" smtClean="0"/>
+              <a:pPr/>
+              <a:t>16</a:t>
             </a:fld>
             <a:endParaRPr lang="en-US"/>
           </a:p>

</xml_diff>

<commit_message>
updated ssaform and opt slides
</commit_message>
<xml_diff>
--- a/assets/ppt/codegen/ssaform3.pptx
+++ b/assets/ppt/codegen/ssaform3.pptx
@@ -258,7 +258,7 @@
             <a:fld id="{2A2B9AA4-819F-8549-A06A-E1B5D9D61F62}" type="datetimeFigureOut">
               <a:rPr lang="en-US" smtClean="0"/>
               <a:pPr/>
-              <a:t>11/14/20</a:t>
+              <a:t>11/16/20</a:t>
             </a:fld>
             <a:endParaRPr lang="en-US"/>
           </a:p>
@@ -2177,7 +2177,7 @@
           <a:p>
             <a:fld id="{37508BEE-B66E-5E46-B50F-23B30D56323F}" type="datetime1">
               <a:rPr lang="en-CA" smtClean="0"/>
-              <a:t>2020-11-14</a:t>
+              <a:t>2020-11-16</a:t>
             </a:fld>
             <a:endParaRPr lang="en-US"/>
           </a:p>
@@ -2375,7 +2375,7 @@
           <a:p>
             <a:fld id="{94ED5F46-E862-7041-B839-1084A839C514}" type="datetime1">
               <a:rPr lang="en-CA" smtClean="0"/>
-              <a:t>2020-11-14</a:t>
+              <a:t>2020-11-16</a:t>
             </a:fld>
             <a:endParaRPr lang="en-US"/>
           </a:p>
@@ -2583,7 +2583,7 @@
           <a:p>
             <a:fld id="{A0755934-2EEA-454B-B47B-39481B16D93C}" type="datetime1">
               <a:rPr lang="en-CA" smtClean="0"/>
-              <a:t>2020-11-14</a:t>
+              <a:t>2020-11-16</a:t>
             </a:fld>
             <a:endParaRPr lang="en-US"/>
           </a:p>
@@ -3646,7 +3646,7 @@
           <a:p>
             <a:fld id="{33CDF6D5-475A-F046-87CA-412EB71D7141}" type="datetime1">
               <a:rPr lang="en-CA" smtClean="0"/>
-              <a:t>2020-11-14</a:t>
+              <a:t>2020-11-16</a:t>
             </a:fld>
             <a:endParaRPr/>
           </a:p>
@@ -4062,7 +4062,7 @@
           <a:p>
             <a:fld id="{BD806BE7-D4FF-0747-A46D-9D28D6793F9A}" type="datetime1">
               <a:rPr lang="en-CA" smtClean="0"/>
-              <a:t>2020-11-14</a:t>
+              <a:t>2020-11-16</a:t>
             </a:fld>
             <a:endParaRPr lang="en-US"/>
           </a:p>
@@ -4337,7 +4337,7 @@
           <a:p>
             <a:fld id="{FC112D8A-ADE8-E648-9A51-673455F77FA4}" type="datetime1">
               <a:rPr lang="en-CA" smtClean="0"/>
-              <a:t>2020-11-14</a:t>
+              <a:t>2020-11-16</a:t>
             </a:fld>
             <a:endParaRPr lang="en-US"/>
           </a:p>
@@ -4602,7 +4602,7 @@
           <a:p>
             <a:fld id="{A1C4D21D-FE66-404B-9D48-8813A41FDE83}" type="datetime1">
               <a:rPr lang="en-CA" smtClean="0"/>
-              <a:t>2020-11-14</a:t>
+              <a:t>2020-11-16</a:t>
             </a:fld>
             <a:endParaRPr lang="en-US"/>
           </a:p>
@@ -5014,7 +5014,7 @@
           <a:p>
             <a:fld id="{BC43913A-9187-9E4F-99AD-E5F9D3D715A1}" type="datetime1">
               <a:rPr lang="en-CA" smtClean="0"/>
-              <a:t>2020-11-14</a:t>
+              <a:t>2020-11-16</a:t>
             </a:fld>
             <a:endParaRPr lang="en-US"/>
           </a:p>
@@ -5155,7 +5155,7 @@
           <a:p>
             <a:fld id="{D640FCF0-750B-2849-A907-F64332DB8FEE}" type="datetime1">
               <a:rPr lang="en-CA" smtClean="0"/>
-              <a:t>2020-11-14</a:t>
+              <a:t>2020-11-16</a:t>
             </a:fld>
             <a:endParaRPr lang="en-US"/>
           </a:p>
@@ -5268,7 +5268,7 @@
           <a:p>
             <a:fld id="{C84DF663-3970-9B45-8274-AA8FABDA274B}" type="datetime1">
               <a:rPr lang="en-CA" smtClean="0"/>
-              <a:t>2020-11-14</a:t>
+              <a:t>2020-11-16</a:t>
             </a:fld>
             <a:endParaRPr lang="en-US"/>
           </a:p>
@@ -5579,7 +5579,7 @@
           <a:p>
             <a:fld id="{2EE809A3-0E53-524E-A233-B12C5DA91D99}" type="datetime1">
               <a:rPr lang="en-CA" smtClean="0"/>
-              <a:t>2020-11-14</a:t>
+              <a:t>2020-11-16</a:t>
             </a:fld>
             <a:endParaRPr lang="en-US"/>
           </a:p>
@@ -5867,7 +5867,7 @@
           <a:p>
             <a:fld id="{CBAFDF68-DD51-514E-B179-E22080947065}" type="datetime1">
               <a:rPr lang="en-CA" smtClean="0"/>
-              <a:t>2020-11-14</a:t>
+              <a:t>2020-11-16</a:t>
             </a:fld>
             <a:endParaRPr lang="en-US"/>
           </a:p>
@@ -6109,7 +6109,7 @@
           <a:p>
             <a:fld id="{CFB5B512-1C0B-5F4A-B1D8-07EED328189A}" type="datetime1">
               <a:rPr lang="en-CA" smtClean="0"/>
-              <a:t>2020-11-14</a:t>
+              <a:t>2020-11-16</a:t>
             </a:fld>
             <a:endParaRPr lang="en-US" dirty="0"/>
           </a:p>
@@ -11358,7 +11358,7 @@
           <a:p>
             <a:r>
               <a:rPr lang="en-US" sz="1800" dirty="0"/>
-              <a:t>4: return k</a:t>
+              <a:t>4: return k2</a:t>
             </a:r>
           </a:p>
         </p:txBody>

</xml_diff>